<commit_message>
updating two imags in knowledge management module to work with dark theme. (#944)
* remove transparency in image.

* remove transparency in image
</commit_message>
<xml_diff>
--- a/learn-bizapps-pr/dyn365-customer-service/creating-and-designing-knowledge-management-solutions/media_layered/Knowledge Management Images.pptx
+++ b/learn-bizapps-pr/dyn365-customer-service/creating-and-designing-knowledge-management-solutions/media_layered/Knowledge Management Images.pptx
@@ -6,18 +6,19 @@
   </p:sldMasterIdLst>
   <p:sldIdLst>
     <p:sldId id="256" r:id="rId2"/>
-    <p:sldId id="259" r:id="rId3"/>
-    <p:sldId id="260" r:id="rId4"/>
-    <p:sldId id="266" r:id="rId5"/>
-    <p:sldId id="267" r:id="rId6"/>
-    <p:sldId id="268" r:id="rId7"/>
-    <p:sldId id="269" r:id="rId8"/>
-    <p:sldId id="261" r:id="rId9"/>
-    <p:sldId id="262" r:id="rId10"/>
-    <p:sldId id="263" r:id="rId11"/>
-    <p:sldId id="264" r:id="rId12"/>
-    <p:sldId id="265" r:id="rId13"/>
-    <p:sldId id="257" r:id="rId14"/>
+    <p:sldId id="270" r:id="rId3"/>
+    <p:sldId id="259" r:id="rId4"/>
+    <p:sldId id="260" r:id="rId5"/>
+    <p:sldId id="266" r:id="rId6"/>
+    <p:sldId id="267" r:id="rId7"/>
+    <p:sldId id="268" r:id="rId8"/>
+    <p:sldId id="269" r:id="rId9"/>
+    <p:sldId id="261" r:id="rId10"/>
+    <p:sldId id="262" r:id="rId11"/>
+    <p:sldId id="263" r:id="rId12"/>
+    <p:sldId id="264" r:id="rId13"/>
+    <p:sldId id="265" r:id="rId14"/>
+    <p:sldId id="257" r:id="rId15"/>
   </p:sldIdLst>
   <p:sldSz cx="12192000" cy="6858000"/>
   <p:notesSz cx="6858000" cy="9144000"/>
@@ -271,7 +272,7 @@
           <a:p>
             <a:fld id="{CA4205BB-ACBA-46A9-A270-817189EC9DFD}" type="datetimeFigureOut">
               <a:rPr lang="en-US" smtClean="0"/>
-              <a:t>11/7/2018</a:t>
+              <a:t>5/1/2019</a:t>
             </a:fld>
             <a:endParaRPr lang="en-US"/>
           </a:p>
@@ -469,7 +470,7 @@
           <a:p>
             <a:fld id="{CA4205BB-ACBA-46A9-A270-817189EC9DFD}" type="datetimeFigureOut">
               <a:rPr lang="en-US" smtClean="0"/>
-              <a:t>11/7/2018</a:t>
+              <a:t>5/1/2019</a:t>
             </a:fld>
             <a:endParaRPr lang="en-US"/>
           </a:p>
@@ -677,7 +678,7 @@
           <a:p>
             <a:fld id="{CA4205BB-ACBA-46A9-A270-817189EC9DFD}" type="datetimeFigureOut">
               <a:rPr lang="en-US" smtClean="0"/>
-              <a:t>11/7/2018</a:t>
+              <a:t>5/1/2019</a:t>
             </a:fld>
             <a:endParaRPr lang="en-US"/>
           </a:p>
@@ -875,7 +876,7 @@
           <a:p>
             <a:fld id="{CA4205BB-ACBA-46A9-A270-817189EC9DFD}" type="datetimeFigureOut">
               <a:rPr lang="en-US" smtClean="0"/>
-              <a:t>11/7/2018</a:t>
+              <a:t>5/1/2019</a:t>
             </a:fld>
             <a:endParaRPr lang="en-US"/>
           </a:p>
@@ -1150,7 +1151,7 @@
           <a:p>
             <a:fld id="{CA4205BB-ACBA-46A9-A270-817189EC9DFD}" type="datetimeFigureOut">
               <a:rPr lang="en-US" smtClean="0"/>
-              <a:t>11/7/2018</a:t>
+              <a:t>5/1/2019</a:t>
             </a:fld>
             <a:endParaRPr lang="en-US"/>
           </a:p>
@@ -1415,7 +1416,7 @@
           <a:p>
             <a:fld id="{CA4205BB-ACBA-46A9-A270-817189EC9DFD}" type="datetimeFigureOut">
               <a:rPr lang="en-US" smtClean="0"/>
-              <a:t>11/7/2018</a:t>
+              <a:t>5/1/2019</a:t>
             </a:fld>
             <a:endParaRPr lang="en-US"/>
           </a:p>
@@ -1827,7 +1828,7 @@
           <a:p>
             <a:fld id="{CA4205BB-ACBA-46A9-A270-817189EC9DFD}" type="datetimeFigureOut">
               <a:rPr lang="en-US" smtClean="0"/>
-              <a:t>11/7/2018</a:t>
+              <a:t>5/1/2019</a:t>
             </a:fld>
             <a:endParaRPr lang="en-US"/>
           </a:p>
@@ -1968,7 +1969,7 @@
           <a:p>
             <a:fld id="{CA4205BB-ACBA-46A9-A270-817189EC9DFD}" type="datetimeFigureOut">
               <a:rPr lang="en-US" smtClean="0"/>
-              <a:t>11/7/2018</a:t>
+              <a:t>5/1/2019</a:t>
             </a:fld>
             <a:endParaRPr lang="en-US"/>
           </a:p>
@@ -2081,7 +2082,7 @@
           <a:p>
             <a:fld id="{CA4205BB-ACBA-46A9-A270-817189EC9DFD}" type="datetimeFigureOut">
               <a:rPr lang="en-US" smtClean="0"/>
-              <a:t>11/7/2018</a:t>
+              <a:t>5/1/2019</a:t>
             </a:fld>
             <a:endParaRPr lang="en-US"/>
           </a:p>
@@ -2392,7 +2393,7 @@
           <a:p>
             <a:fld id="{CA4205BB-ACBA-46A9-A270-817189EC9DFD}" type="datetimeFigureOut">
               <a:rPr lang="en-US" smtClean="0"/>
-              <a:t>11/7/2018</a:t>
+              <a:t>5/1/2019</a:t>
             </a:fld>
             <a:endParaRPr lang="en-US"/>
           </a:p>
@@ -2680,7 +2681,7 @@
           <a:p>
             <a:fld id="{CA4205BB-ACBA-46A9-A270-817189EC9DFD}" type="datetimeFigureOut">
               <a:rPr lang="en-US" smtClean="0"/>
-              <a:t>11/7/2018</a:t>
+              <a:t>5/1/2019</a:t>
             </a:fld>
             <a:endParaRPr lang="en-US"/>
           </a:p>
@@ -2921,7 +2922,7 @@
           <a:p>
             <a:fld id="{CA4205BB-ACBA-46A9-A270-817189EC9DFD}" type="datetimeFigureOut">
               <a:rPr lang="en-US" smtClean="0"/>
-              <a:t>11/7/2018</a:t>
+              <a:t>5/1/2019</a:t>
             </a:fld>
             <a:endParaRPr lang="en-US"/>
           </a:p>
@@ -4205,6 +4206,52 @@
             </p:grpSpPr>
             <p:sp>
               <p:nvSpPr>
+                <p:cNvPr id="53" name="Oval 52">
+                  <a:extLst>
+                    <a:ext uri="{FF2B5EF4-FFF2-40B4-BE49-F238E27FC236}">
+                      <a16:creationId xmlns:a16="http://schemas.microsoft.com/office/drawing/2014/main" id="{CBD07C16-107C-4C04-812C-63DEBA573476}"/>
+                    </a:ext>
+                  </a:extLst>
+                </p:cNvPr>
+                <p:cNvSpPr/>
+                <p:nvPr/>
+              </p:nvSpPr>
+              <p:spPr>
+                <a:xfrm>
+                  <a:off x="5457825" y="2425946"/>
+                  <a:ext cx="638175" cy="638175"/>
+                </a:xfrm>
+                <a:prstGeom prst="ellipse">
+                  <a:avLst/>
+                </a:prstGeom>
+              </p:spPr>
+              <p:style>
+                <a:lnRef idx="2">
+                  <a:schemeClr val="accent1">
+                    <a:shade val="50000"/>
+                  </a:schemeClr>
+                </a:lnRef>
+                <a:fillRef idx="1">
+                  <a:schemeClr val="accent1"/>
+                </a:fillRef>
+                <a:effectRef idx="0">
+                  <a:schemeClr val="accent1"/>
+                </a:effectRef>
+                <a:fontRef idx="minor">
+                  <a:schemeClr val="lt1"/>
+                </a:fontRef>
+              </p:style>
+              <p:txBody>
+                <a:bodyPr rtlCol="0" anchor="ctr"/>
+                <a:lstStyle/>
+                <a:p>
+                  <a:pPr algn="ctr"/>
+                  <a:endParaRPr lang="en-US" dirty="0"/>
+                </a:p>
+              </p:txBody>
+            </p:sp>
+            <p:sp>
+              <p:nvSpPr>
                 <p:cNvPr id="52" name="TextBox 51">
                   <a:extLst>
                     <a:ext uri="{FF2B5EF4-FFF2-40B4-BE49-F238E27FC236}">
@@ -4250,52 +4297,6 @@
                       <a:schemeClr val="bg1"/>
                     </a:solidFill>
                   </a:endParaRPr>
-                </a:p>
-              </p:txBody>
-            </p:sp>
-            <p:sp>
-              <p:nvSpPr>
-                <p:cNvPr id="53" name="Oval 52">
-                  <a:extLst>
-                    <a:ext uri="{FF2B5EF4-FFF2-40B4-BE49-F238E27FC236}">
-                      <a16:creationId xmlns:a16="http://schemas.microsoft.com/office/drawing/2014/main" id="{CBD07C16-107C-4C04-812C-63DEBA573476}"/>
-                    </a:ext>
-                  </a:extLst>
-                </p:cNvPr>
-                <p:cNvSpPr/>
-                <p:nvPr/>
-              </p:nvSpPr>
-              <p:spPr>
-                <a:xfrm>
-                  <a:off x="5457825" y="2425946"/>
-                  <a:ext cx="638175" cy="638175"/>
-                </a:xfrm>
-                <a:prstGeom prst="ellipse">
-                  <a:avLst/>
-                </a:prstGeom>
-              </p:spPr>
-              <p:style>
-                <a:lnRef idx="2">
-                  <a:schemeClr val="accent1">
-                    <a:shade val="50000"/>
-                  </a:schemeClr>
-                </a:lnRef>
-                <a:fillRef idx="1">
-                  <a:schemeClr val="accent1"/>
-                </a:fillRef>
-                <a:effectRef idx="0">
-                  <a:schemeClr val="accent1"/>
-                </a:effectRef>
-                <a:fontRef idx="minor">
-                  <a:schemeClr val="lt1"/>
-                </a:fontRef>
-              </p:style>
-              <p:txBody>
-                <a:bodyPr rtlCol="0" anchor="ctr"/>
-                <a:lstStyle/>
-                <a:p>
-                  <a:pPr algn="ctr"/>
-                  <a:endParaRPr lang="en-US" dirty="0"/>
                 </a:p>
               </p:txBody>
             </p:sp>
@@ -4425,7 +4426,7 @@
             <a:lstStyle/>
             <a:p>
               <a:pPr algn="ctr"/>
-              <a:endParaRPr lang="en-US"/>
+              <a:endParaRPr lang="en-US" dirty="0"/>
             </a:p>
           </p:txBody>
         </p:sp>
@@ -6050,6 +6051,66 @@
           <p:cNvPr id="4" name="Picture 3">
             <a:extLst>
               <a:ext uri="{FF2B5EF4-FFF2-40B4-BE49-F238E27FC236}">
+                <a16:creationId xmlns:a16="http://schemas.microsoft.com/office/drawing/2014/main" id="{20748983-A362-4542-B444-253429BF1F41}"/>
+              </a:ext>
+            </a:extLst>
+          </p:cNvPr>
+          <p:cNvPicPr>
+            <a:picLocks noChangeAspect="1"/>
+          </p:cNvPicPr>
+          <p:nvPr/>
+        </p:nvPicPr>
+        <p:blipFill>
+          <a:blip r:embed="rId2"/>
+          <a:stretch>
+            <a:fillRect/>
+          </a:stretch>
+        </p:blipFill>
+        <p:spPr>
+          <a:xfrm>
+            <a:off x="3200762" y="867095"/>
+            <a:ext cx="5790476" cy="5123809"/>
+          </a:xfrm>
+          <a:prstGeom prst="rect">
+            <a:avLst/>
+          </a:prstGeom>
+        </p:spPr>
+      </p:pic>
+    </p:spTree>
+    <p:extLst>
+      <p:ext uri="{BB962C8B-B14F-4D97-AF65-F5344CB8AC3E}">
+        <p14:creationId xmlns:p14="http://schemas.microsoft.com/office/powerpoint/2010/main" val="2595486357"/>
+      </p:ext>
+    </p:extLst>
+  </p:cSld>
+  <p:clrMapOvr>
+    <a:masterClrMapping/>
+  </p:clrMapOvr>
+</p:sld>
+</file>
+
+<file path=ppt/slides/slide11.xml><?xml version="1.0" encoding="utf-8"?>
+<p:sld xmlns:a="http://schemas.openxmlformats.org/drawingml/2006/main" xmlns:r="http://schemas.openxmlformats.org/officeDocument/2006/relationships" xmlns:p="http://schemas.openxmlformats.org/presentationml/2006/main">
+  <p:cSld>
+    <p:spTree>
+      <p:nvGrpSpPr>
+        <p:cNvPr id="1" name=""/>
+        <p:cNvGrpSpPr/>
+        <p:nvPr/>
+      </p:nvGrpSpPr>
+      <p:grpSpPr>
+        <a:xfrm>
+          <a:off x="0" y="0"/>
+          <a:ext cx="0" cy="0"/>
+          <a:chOff x="0" y="0"/>
+          <a:chExt cx="0" cy="0"/>
+        </a:xfrm>
+      </p:grpSpPr>
+      <p:pic>
+        <p:nvPicPr>
+          <p:cNvPr id="4" name="Picture 3">
+            <a:extLst>
+              <a:ext uri="{FF2B5EF4-FFF2-40B4-BE49-F238E27FC236}">
                 <a16:creationId xmlns:a16="http://schemas.microsoft.com/office/drawing/2014/main" id="{EB2AA400-E6E0-44F5-ABF0-45D482BD4481}"/>
               </a:ext>
             </a:extLst>
@@ -6088,7 +6149,7 @@
 </p:sld>
 </file>
 
-<file path=ppt/slides/slide11.xml><?xml version="1.0" encoding="utf-8"?>
+<file path=ppt/slides/slide12.xml><?xml version="1.0" encoding="utf-8"?>
 <p:sld xmlns:a="http://schemas.openxmlformats.org/drawingml/2006/main" xmlns:r="http://schemas.openxmlformats.org/officeDocument/2006/relationships" xmlns:p="http://schemas.openxmlformats.org/presentationml/2006/main">
   <p:cSld>
     <p:spTree>
@@ -6370,7 +6431,7 @@
 </p:sld>
 </file>
 
-<file path=ppt/slides/slide12.xml><?xml version="1.0" encoding="utf-8"?>
+<file path=ppt/slides/slide13.xml><?xml version="1.0" encoding="utf-8"?>
 <p:sld xmlns:a="http://schemas.openxmlformats.org/drawingml/2006/main" xmlns:r="http://schemas.openxmlformats.org/officeDocument/2006/relationships" xmlns:p="http://schemas.openxmlformats.org/presentationml/2006/main">
   <p:cSld>
     <p:spTree>
@@ -6523,7 +6584,7 @@
 </p:sld>
 </file>
 
-<file path=ppt/slides/slide13.xml><?xml version="1.0" encoding="utf-8"?>
+<file path=ppt/slides/slide14.xml><?xml version="1.0" encoding="utf-8"?>
 <p:sld xmlns:a="http://schemas.openxmlformats.org/drawingml/2006/main" xmlns:r="http://schemas.openxmlformats.org/officeDocument/2006/relationships" xmlns:p="http://schemas.openxmlformats.org/presentationml/2006/main">
   <p:cSld>
     <p:spTree>
@@ -8253,6 +8314,1926 @@
           <a:chExt cx="0" cy="0"/>
         </a:xfrm>
       </p:grpSpPr>
+      <p:grpSp>
+        <p:nvGrpSpPr>
+          <p:cNvPr id="2" name="Group 1">
+            <a:extLst>
+              <a:ext uri="{FF2B5EF4-FFF2-40B4-BE49-F238E27FC236}">
+                <a16:creationId xmlns:a16="http://schemas.microsoft.com/office/drawing/2014/main" id="{D878EF1D-EFCC-42C4-AD6D-C0B72CD2A801}"/>
+              </a:ext>
+            </a:extLst>
+          </p:cNvPr>
+          <p:cNvGrpSpPr/>
+          <p:nvPr/>
+        </p:nvGrpSpPr>
+        <p:grpSpPr>
+          <a:xfrm>
+            <a:off x="165422" y="504826"/>
+            <a:ext cx="11861156" cy="4857750"/>
+            <a:chOff x="165422" y="504826"/>
+            <a:chExt cx="11861156" cy="4857750"/>
+          </a:xfrm>
+          <a:solidFill>
+            <a:schemeClr val="bg1"/>
+          </a:solidFill>
+        </p:grpSpPr>
+        <p:sp>
+          <p:nvSpPr>
+            <p:cNvPr id="38" name="TextBox 37">
+              <a:extLst>
+                <a:ext uri="{FF2B5EF4-FFF2-40B4-BE49-F238E27FC236}">
+                  <a16:creationId xmlns:a16="http://schemas.microsoft.com/office/drawing/2014/main" id="{C276749F-69E4-4D76-A91B-5378246FBE21}"/>
+                </a:ext>
+              </a:extLst>
+            </p:cNvPr>
+            <p:cNvSpPr txBox="1"/>
+            <p:nvPr/>
+          </p:nvSpPr>
+          <p:spPr>
+            <a:xfrm>
+              <a:off x="288090" y="4650526"/>
+              <a:ext cx="1384161" cy="307777"/>
+            </a:xfrm>
+            <a:prstGeom prst="rect">
+              <a:avLst/>
+            </a:prstGeom>
+            <a:grpFill/>
+          </p:spPr>
+          <p:txBody>
+            <a:bodyPr wrap="none" rtlCol="0">
+              <a:spAutoFit/>
+            </a:bodyPr>
+            <a:lstStyle/>
+            <a:p>
+              <a:r>
+                <a:rPr lang="en-US" sz="1400" dirty="0"/>
+                <a:t>Create an article</a:t>
+              </a:r>
+            </a:p>
+          </p:txBody>
+        </p:sp>
+        <p:sp>
+          <p:nvSpPr>
+            <p:cNvPr id="39" name="TextBox 38">
+              <a:extLst>
+                <a:ext uri="{FF2B5EF4-FFF2-40B4-BE49-F238E27FC236}">
+                  <a16:creationId xmlns:a16="http://schemas.microsoft.com/office/drawing/2014/main" id="{EA37024C-47E4-467F-9146-AFC6C642D65B}"/>
+                </a:ext>
+              </a:extLst>
+            </p:cNvPr>
+            <p:cNvSpPr txBox="1"/>
+            <p:nvPr/>
+          </p:nvSpPr>
+          <p:spPr>
+            <a:xfrm>
+              <a:off x="2160672" y="4652468"/>
+              <a:ext cx="1506759" cy="307777"/>
+            </a:xfrm>
+            <a:prstGeom prst="rect">
+              <a:avLst/>
+            </a:prstGeom>
+            <a:grpFill/>
+          </p:spPr>
+          <p:txBody>
+            <a:bodyPr wrap="none" rtlCol="0">
+              <a:spAutoFit/>
+            </a:bodyPr>
+            <a:lstStyle/>
+            <a:p>
+              <a:r>
+                <a:rPr lang="en-US" sz="1400" dirty="0"/>
+                <a:t>Update the article</a:t>
+              </a:r>
+            </a:p>
+          </p:txBody>
+        </p:sp>
+        <p:sp>
+          <p:nvSpPr>
+            <p:cNvPr id="40" name="TextBox 39">
+              <a:extLst>
+                <a:ext uri="{FF2B5EF4-FFF2-40B4-BE49-F238E27FC236}">
+                  <a16:creationId xmlns:a16="http://schemas.microsoft.com/office/drawing/2014/main" id="{BAFD6919-D736-4F7D-956F-A06570F03BD5}"/>
+                </a:ext>
+              </a:extLst>
+            </p:cNvPr>
+            <p:cNvSpPr txBox="1"/>
+            <p:nvPr/>
+          </p:nvSpPr>
+          <p:spPr>
+            <a:xfrm>
+              <a:off x="971121" y="1766765"/>
+              <a:ext cx="1845442" cy="307777"/>
+            </a:xfrm>
+            <a:prstGeom prst="rect">
+              <a:avLst/>
+            </a:prstGeom>
+            <a:grpFill/>
+          </p:spPr>
+          <p:txBody>
+            <a:bodyPr wrap="none" rtlCol="0">
+              <a:spAutoFit/>
+            </a:bodyPr>
+            <a:lstStyle/>
+            <a:p>
+              <a:r>
+                <a:rPr lang="en-US" sz="1400" dirty="0"/>
+                <a:t>Mark article for review</a:t>
+              </a:r>
+            </a:p>
+          </p:txBody>
+        </p:sp>
+        <p:grpSp>
+          <p:nvGrpSpPr>
+            <p:cNvPr id="50" name="Group 49">
+              <a:extLst>
+                <a:ext uri="{FF2B5EF4-FFF2-40B4-BE49-F238E27FC236}">
+                  <a16:creationId xmlns:a16="http://schemas.microsoft.com/office/drawing/2014/main" id="{155CBB34-30B9-4EA0-9308-57F3E8A0CC59}"/>
+                </a:ext>
+              </a:extLst>
+            </p:cNvPr>
+            <p:cNvGrpSpPr/>
+            <p:nvPr/>
+          </p:nvGrpSpPr>
+          <p:grpSpPr>
+            <a:xfrm>
+              <a:off x="3991418" y="2434955"/>
+              <a:ext cx="190057" cy="180975"/>
+              <a:chOff x="5591618" y="2514992"/>
+              <a:chExt cx="190057" cy="180975"/>
+            </a:xfrm>
+            <a:grpFill/>
+          </p:grpSpPr>
+          <p:sp>
+            <p:nvSpPr>
+              <p:cNvPr id="45" name="Rectangle 44">
+                <a:extLst>
+                  <a:ext uri="{FF2B5EF4-FFF2-40B4-BE49-F238E27FC236}">
+                    <a16:creationId xmlns:a16="http://schemas.microsoft.com/office/drawing/2014/main" id="{DE407330-139C-47D2-8AE5-01A1088FEB35}"/>
+                  </a:ext>
+                </a:extLst>
+              </p:cNvPr>
+              <p:cNvSpPr/>
+              <p:nvPr/>
+            </p:nvSpPr>
+            <p:spPr>
+              <a:xfrm>
+                <a:off x="5591618" y="2563009"/>
+                <a:ext cx="123041" cy="123041"/>
+              </a:xfrm>
+              <a:prstGeom prst="rect">
+                <a:avLst/>
+              </a:prstGeom>
+              <a:grpFill/>
+              <a:ln w="28575">
+                <a:solidFill>
+                  <a:schemeClr val="bg1"/>
+                </a:solidFill>
+              </a:ln>
+            </p:spPr>
+            <p:style>
+              <a:lnRef idx="2">
+                <a:schemeClr val="accent1">
+                  <a:shade val="50000"/>
+                </a:schemeClr>
+              </a:lnRef>
+              <a:fillRef idx="1">
+                <a:schemeClr val="accent1"/>
+              </a:fillRef>
+              <a:effectRef idx="0">
+                <a:schemeClr val="accent1"/>
+              </a:effectRef>
+              <a:fontRef idx="minor">
+                <a:schemeClr val="lt1"/>
+              </a:fontRef>
+            </p:style>
+            <p:txBody>
+              <a:bodyPr rtlCol="0" anchor="ctr"/>
+              <a:lstStyle/>
+              <a:p>
+                <a:pPr algn="ctr"/>
+                <a:endParaRPr lang="en-US"/>
+              </a:p>
+            </p:txBody>
+          </p:sp>
+          <p:pic>
+            <p:nvPicPr>
+              <p:cNvPr id="44" name="Graphic 43" descr="Checkmark">
+                <a:extLst>
+                  <a:ext uri="{FF2B5EF4-FFF2-40B4-BE49-F238E27FC236}">
+                    <a16:creationId xmlns:a16="http://schemas.microsoft.com/office/drawing/2014/main" id="{AE43AA67-7A26-4ACE-A74E-9A8682AD3A98}"/>
+                  </a:ext>
+                </a:extLst>
+              </p:cNvPr>
+              <p:cNvPicPr>
+                <a:picLocks noChangeAspect="1"/>
+              </p:cNvPicPr>
+              <p:nvPr/>
+            </p:nvPicPr>
+            <p:blipFill>
+              <a:blip r:embed="rId2">
+                <a:extLst>
+                  <a:ext uri="{28A0092B-C50C-407E-A947-70E740481C1C}">
+                    <a14:useLocalDpi xmlns:a14="http://schemas.microsoft.com/office/drawing/2010/main" val="0"/>
+                  </a:ext>
+                  <a:ext uri="{96DAC541-7B7A-43D3-8B79-37D633B846F1}">
+                    <asvg:svgBlip xmlns:asvg="http://schemas.microsoft.com/office/drawing/2016/SVG/main" r:embed="rId3"/>
+                  </a:ext>
+                </a:extLst>
+              </a:blip>
+              <a:stretch>
+                <a:fillRect/>
+              </a:stretch>
+            </p:blipFill>
+            <p:spPr>
+              <a:xfrm>
+                <a:off x="5600700" y="2514992"/>
+                <a:ext cx="180975" cy="180975"/>
+              </a:xfrm>
+              <a:prstGeom prst="rect">
+                <a:avLst/>
+              </a:prstGeom>
+            </p:spPr>
+          </p:pic>
+        </p:grpSp>
+        <p:pic>
+          <p:nvPicPr>
+            <p:cNvPr id="17" name="Graphic 16" descr="Arrow: Rotate right">
+              <a:extLst>
+                <a:ext uri="{FF2B5EF4-FFF2-40B4-BE49-F238E27FC236}">
+                  <a16:creationId xmlns:a16="http://schemas.microsoft.com/office/drawing/2014/main" id="{E11666D0-51F1-4743-8D43-43E61730D4DE}"/>
+                </a:ext>
+              </a:extLst>
+            </p:cNvPr>
+            <p:cNvPicPr>
+              <a:picLocks noChangeAspect="1"/>
+            </p:cNvPicPr>
+            <p:nvPr/>
+          </p:nvPicPr>
+          <p:blipFill>
+            <a:blip r:embed="rId4">
+              <a:extLst>
+                <a:ext uri="{28A0092B-C50C-407E-A947-70E740481C1C}">
+                  <a14:useLocalDpi xmlns:a14="http://schemas.microsoft.com/office/drawing/2010/main" val="0"/>
+                </a:ext>
+                <a:ext uri="{96DAC541-7B7A-43D3-8B79-37D633B846F1}">
+                  <asvg:svgBlip xmlns:asvg="http://schemas.microsoft.com/office/drawing/2016/SVG/main" r:embed="rId5"/>
+                </a:ext>
+              </a:extLst>
+            </a:blip>
+            <a:stretch>
+              <a:fillRect/>
+            </a:stretch>
+          </p:blipFill>
+          <p:spPr>
+            <a:xfrm>
+              <a:off x="7370079" y="2419264"/>
+              <a:ext cx="231263" cy="231263"/>
+            </a:xfrm>
+            <a:prstGeom prst="rect">
+              <a:avLst/>
+            </a:prstGeom>
+          </p:spPr>
+        </p:pic>
+        <p:sp>
+          <p:nvSpPr>
+            <p:cNvPr id="70" name="Rectangle: Rounded Corners 69">
+              <a:extLst>
+                <a:ext uri="{FF2B5EF4-FFF2-40B4-BE49-F238E27FC236}">
+                  <a16:creationId xmlns:a16="http://schemas.microsoft.com/office/drawing/2014/main" id="{14318C9E-DB99-4412-931A-D6724F49D08E}"/>
+                </a:ext>
+              </a:extLst>
+            </p:cNvPr>
+            <p:cNvSpPr/>
+            <p:nvPr/>
+          </p:nvSpPr>
+          <p:spPr>
+            <a:xfrm>
+              <a:off x="165422" y="504826"/>
+              <a:ext cx="11861156" cy="4857750"/>
+            </a:xfrm>
+            <a:prstGeom prst="roundRect">
+              <a:avLst>
+                <a:gd name="adj" fmla="val 3596"/>
+              </a:avLst>
+            </a:prstGeom>
+            <a:grpFill/>
+            <a:ln w="38100"/>
+          </p:spPr>
+          <p:style>
+            <a:lnRef idx="2">
+              <a:schemeClr val="accent1">
+                <a:shade val="50000"/>
+              </a:schemeClr>
+            </a:lnRef>
+            <a:fillRef idx="1">
+              <a:schemeClr val="accent1"/>
+            </a:fillRef>
+            <a:effectRef idx="0">
+              <a:schemeClr val="accent1"/>
+            </a:effectRef>
+            <a:fontRef idx="minor">
+              <a:schemeClr val="lt1"/>
+            </a:fontRef>
+          </p:style>
+          <p:txBody>
+            <a:bodyPr rtlCol="0" anchor="ctr"/>
+            <a:lstStyle/>
+            <a:p>
+              <a:pPr algn="ctr"/>
+              <a:endParaRPr lang="en-US" dirty="0"/>
+            </a:p>
+          </p:txBody>
+        </p:sp>
+        <p:cxnSp>
+          <p:nvCxnSpPr>
+            <p:cNvPr id="72" name="Connector: Elbow 71">
+              <a:extLst>
+                <a:ext uri="{FF2B5EF4-FFF2-40B4-BE49-F238E27FC236}">
+                  <a16:creationId xmlns:a16="http://schemas.microsoft.com/office/drawing/2014/main" id="{F2BA3C4E-A975-4F84-B67F-E4B70605881B}"/>
+                </a:ext>
+              </a:extLst>
+            </p:cNvPr>
+            <p:cNvCxnSpPr>
+              <a:cxnSpLocks/>
+            </p:cNvCxnSpPr>
+            <p:nvPr/>
+          </p:nvCxnSpPr>
+          <p:spPr>
+            <a:xfrm flipV="1">
+              <a:off x="1549511" y="3124050"/>
+              <a:ext cx="457864" cy="1112982"/>
+            </a:xfrm>
+            <a:prstGeom prst="bentConnector2">
+              <a:avLst/>
+            </a:prstGeom>
+            <a:grpFill/>
+            <a:ln w="57150">
+              <a:solidFill>
+                <a:schemeClr val="bg2">
+                  <a:lumMod val="75000"/>
+                </a:schemeClr>
+              </a:solidFill>
+              <a:tailEnd type="triangle"/>
+            </a:ln>
+          </p:spPr>
+          <p:style>
+            <a:lnRef idx="1">
+              <a:schemeClr val="accent1"/>
+            </a:lnRef>
+            <a:fillRef idx="0">
+              <a:schemeClr val="accent1"/>
+            </a:fillRef>
+            <a:effectRef idx="0">
+              <a:schemeClr val="accent1"/>
+            </a:effectRef>
+            <a:fontRef idx="minor">
+              <a:schemeClr val="tx1"/>
+            </a:fontRef>
+          </p:style>
+        </p:cxnSp>
+        <p:cxnSp>
+          <p:nvCxnSpPr>
+            <p:cNvPr id="87" name="Connector: Elbow 86">
+              <a:extLst>
+                <a:ext uri="{FF2B5EF4-FFF2-40B4-BE49-F238E27FC236}">
+                  <a16:creationId xmlns:a16="http://schemas.microsoft.com/office/drawing/2014/main" id="{D1D5CE21-3E25-43DB-BAE9-27DFD1D04C76}"/>
+                </a:ext>
+              </a:extLst>
+            </p:cNvPr>
+            <p:cNvCxnSpPr>
+              <a:cxnSpLocks/>
+            </p:cNvCxnSpPr>
+            <p:nvPr/>
+          </p:nvCxnSpPr>
+          <p:spPr>
+            <a:xfrm rot="10800000">
+              <a:off x="2001693" y="3124054"/>
+              <a:ext cx="457529" cy="1110707"/>
+            </a:xfrm>
+            <a:prstGeom prst="bentConnector2">
+              <a:avLst/>
+            </a:prstGeom>
+            <a:grpFill/>
+            <a:ln w="57150">
+              <a:solidFill>
+                <a:schemeClr val="bg2">
+                  <a:lumMod val="75000"/>
+                </a:schemeClr>
+              </a:solidFill>
+              <a:tailEnd type="triangle"/>
+            </a:ln>
+          </p:spPr>
+          <p:style>
+            <a:lnRef idx="1">
+              <a:schemeClr val="accent1"/>
+            </a:lnRef>
+            <a:fillRef idx="0">
+              <a:schemeClr val="accent1"/>
+            </a:fillRef>
+            <a:effectRef idx="0">
+              <a:schemeClr val="accent1"/>
+            </a:effectRef>
+            <a:fontRef idx="minor">
+              <a:schemeClr val="tx1"/>
+            </a:fontRef>
+          </p:style>
+        </p:cxnSp>
+        <p:cxnSp>
+          <p:nvCxnSpPr>
+            <p:cNvPr id="91" name="Straight Arrow Connector 90">
+              <a:extLst>
+                <a:ext uri="{FF2B5EF4-FFF2-40B4-BE49-F238E27FC236}">
+                  <a16:creationId xmlns:a16="http://schemas.microsoft.com/office/drawing/2014/main" id="{B42C1A5E-F83B-4456-AE54-668DB1C37E06}"/>
+                </a:ext>
+              </a:extLst>
+            </p:cNvPr>
+            <p:cNvCxnSpPr>
+              <a:cxnSpLocks/>
+            </p:cNvCxnSpPr>
+            <p:nvPr/>
+          </p:nvCxnSpPr>
+          <p:spPr>
+            <a:xfrm flipV="1">
+              <a:off x="2464575" y="2664997"/>
+              <a:ext cx="1393050" cy="1853"/>
+            </a:xfrm>
+            <a:prstGeom prst="straightConnector1">
+              <a:avLst/>
+            </a:prstGeom>
+            <a:grpFill/>
+            <a:ln w="57150">
+              <a:solidFill>
+                <a:schemeClr val="bg2">
+                  <a:lumMod val="75000"/>
+                </a:schemeClr>
+              </a:solidFill>
+              <a:tailEnd type="triangle"/>
+            </a:ln>
+          </p:spPr>
+          <p:style>
+            <a:lnRef idx="1">
+              <a:schemeClr val="accent1"/>
+            </a:lnRef>
+            <a:fillRef idx="0">
+              <a:schemeClr val="accent1"/>
+            </a:fillRef>
+            <a:effectRef idx="0">
+              <a:schemeClr val="accent1"/>
+            </a:effectRef>
+            <a:fontRef idx="minor">
+              <a:schemeClr val="tx1"/>
+            </a:fontRef>
+          </p:style>
+        </p:cxnSp>
+        <p:cxnSp>
+          <p:nvCxnSpPr>
+            <p:cNvPr id="94" name="Connector: Elbow 93">
+              <a:extLst>
+                <a:ext uri="{FF2B5EF4-FFF2-40B4-BE49-F238E27FC236}">
+                  <a16:creationId xmlns:a16="http://schemas.microsoft.com/office/drawing/2014/main" id="{7A8EA1EE-62C7-4F40-B606-2B3ECF3338F5}"/>
+                </a:ext>
+              </a:extLst>
+            </p:cNvPr>
+            <p:cNvCxnSpPr>
+              <a:cxnSpLocks/>
+            </p:cNvCxnSpPr>
+            <p:nvPr/>
+          </p:nvCxnSpPr>
+          <p:spPr>
+            <a:xfrm flipV="1">
+              <a:off x="5362576" y="1788146"/>
+              <a:ext cx="647212" cy="897754"/>
+            </a:xfrm>
+            <a:prstGeom prst="bentConnector2">
+              <a:avLst/>
+            </a:prstGeom>
+            <a:grpFill/>
+            <a:ln w="57150">
+              <a:solidFill>
+                <a:schemeClr val="bg2">
+                  <a:lumMod val="75000"/>
+                </a:schemeClr>
+              </a:solidFill>
+              <a:tailEnd type="triangle"/>
+            </a:ln>
+          </p:spPr>
+          <p:style>
+            <a:lnRef idx="1">
+              <a:schemeClr val="accent1"/>
+            </a:lnRef>
+            <a:fillRef idx="0">
+              <a:schemeClr val="accent1"/>
+            </a:fillRef>
+            <a:effectRef idx="0">
+              <a:schemeClr val="accent1"/>
+            </a:effectRef>
+            <a:fontRef idx="minor">
+              <a:schemeClr val="tx1"/>
+            </a:fontRef>
+          </p:style>
+        </p:cxnSp>
+        <p:cxnSp>
+          <p:nvCxnSpPr>
+            <p:cNvPr id="96" name="Connector: Elbow 95">
+              <a:extLst>
+                <a:ext uri="{FF2B5EF4-FFF2-40B4-BE49-F238E27FC236}">
+                  <a16:creationId xmlns:a16="http://schemas.microsoft.com/office/drawing/2014/main" id="{E64D089C-0481-4804-88A6-E96E15C8BDD1}"/>
+                </a:ext>
+              </a:extLst>
+            </p:cNvPr>
+            <p:cNvCxnSpPr>
+              <a:cxnSpLocks/>
+            </p:cNvCxnSpPr>
+            <p:nvPr/>
+          </p:nvCxnSpPr>
+          <p:spPr>
+            <a:xfrm>
+              <a:off x="5362576" y="2685900"/>
+              <a:ext cx="639915" cy="928531"/>
+            </a:xfrm>
+            <a:prstGeom prst="bentConnector2">
+              <a:avLst/>
+            </a:prstGeom>
+            <a:grpFill/>
+            <a:ln w="57150">
+              <a:solidFill>
+                <a:schemeClr val="bg2">
+                  <a:lumMod val="75000"/>
+                </a:schemeClr>
+              </a:solidFill>
+              <a:tailEnd type="triangle"/>
+            </a:ln>
+          </p:spPr>
+          <p:style>
+            <a:lnRef idx="1">
+              <a:schemeClr val="accent1"/>
+            </a:lnRef>
+            <a:fillRef idx="0">
+              <a:schemeClr val="accent1"/>
+            </a:fillRef>
+            <a:effectRef idx="0">
+              <a:schemeClr val="accent1"/>
+            </a:effectRef>
+            <a:fontRef idx="minor">
+              <a:schemeClr val="tx1"/>
+            </a:fontRef>
+          </p:style>
+        </p:cxnSp>
+        <p:cxnSp>
+          <p:nvCxnSpPr>
+            <p:cNvPr id="99" name="Connector: Elbow 98">
+              <a:extLst>
+                <a:ext uri="{FF2B5EF4-FFF2-40B4-BE49-F238E27FC236}">
+                  <a16:creationId xmlns:a16="http://schemas.microsoft.com/office/drawing/2014/main" id="{4DE18F66-3781-44DB-BC20-1BC092B425C1}"/>
+                </a:ext>
+              </a:extLst>
+            </p:cNvPr>
+            <p:cNvCxnSpPr>
+              <a:cxnSpLocks/>
+            </p:cNvCxnSpPr>
+            <p:nvPr/>
+          </p:nvCxnSpPr>
+          <p:spPr>
+            <a:xfrm>
+              <a:off x="6466988" y="1330946"/>
+              <a:ext cx="1488789" cy="878704"/>
+            </a:xfrm>
+            <a:prstGeom prst="bentConnector2">
+              <a:avLst/>
+            </a:prstGeom>
+            <a:grpFill/>
+            <a:ln w="57150">
+              <a:solidFill>
+                <a:schemeClr val="bg2">
+                  <a:lumMod val="75000"/>
+                </a:schemeClr>
+              </a:solidFill>
+              <a:tailEnd type="triangle"/>
+            </a:ln>
+          </p:spPr>
+          <p:style>
+            <a:lnRef idx="1">
+              <a:schemeClr val="accent1"/>
+            </a:lnRef>
+            <a:fillRef idx="0">
+              <a:schemeClr val="accent1"/>
+            </a:fillRef>
+            <a:effectRef idx="0">
+              <a:schemeClr val="accent1"/>
+            </a:effectRef>
+            <a:fontRef idx="minor">
+              <a:schemeClr val="tx1"/>
+            </a:fontRef>
+          </p:style>
+        </p:cxnSp>
+        <p:cxnSp>
+          <p:nvCxnSpPr>
+            <p:cNvPr id="101" name="Connector: Elbow 100">
+              <a:extLst>
+                <a:ext uri="{FF2B5EF4-FFF2-40B4-BE49-F238E27FC236}">
+                  <a16:creationId xmlns:a16="http://schemas.microsoft.com/office/drawing/2014/main" id="{FD982D2F-B948-436A-BC4E-1CEE1F4C0603}"/>
+                </a:ext>
+              </a:extLst>
+            </p:cNvPr>
+            <p:cNvCxnSpPr>
+              <a:cxnSpLocks/>
+            </p:cNvCxnSpPr>
+            <p:nvPr/>
+          </p:nvCxnSpPr>
+          <p:spPr>
+            <a:xfrm>
+              <a:off x="8536802" y="2686704"/>
+              <a:ext cx="1345128" cy="1499382"/>
+            </a:xfrm>
+            <a:prstGeom prst="bentConnector3">
+              <a:avLst/>
+            </a:prstGeom>
+            <a:grpFill/>
+            <a:ln w="57150">
+              <a:solidFill>
+                <a:schemeClr val="bg2">
+                  <a:lumMod val="75000"/>
+                </a:schemeClr>
+              </a:solidFill>
+              <a:tailEnd type="triangle"/>
+            </a:ln>
+          </p:spPr>
+          <p:style>
+            <a:lnRef idx="1">
+              <a:schemeClr val="accent1"/>
+            </a:lnRef>
+            <a:fillRef idx="0">
+              <a:schemeClr val="accent1"/>
+            </a:fillRef>
+            <a:effectRef idx="0">
+              <a:schemeClr val="accent1"/>
+            </a:effectRef>
+            <a:fontRef idx="minor">
+              <a:schemeClr val="tx1"/>
+            </a:fontRef>
+          </p:style>
+        </p:cxnSp>
+        <p:cxnSp>
+          <p:nvCxnSpPr>
+            <p:cNvPr id="103" name="Connector: Elbow 102">
+              <a:extLst>
+                <a:ext uri="{FF2B5EF4-FFF2-40B4-BE49-F238E27FC236}">
+                  <a16:creationId xmlns:a16="http://schemas.microsoft.com/office/drawing/2014/main" id="{5696DBDF-5736-4095-8B20-D7AF1A8A7A0D}"/>
+                </a:ext>
+              </a:extLst>
+            </p:cNvPr>
+            <p:cNvCxnSpPr>
+              <a:cxnSpLocks/>
+            </p:cNvCxnSpPr>
+            <p:nvPr/>
+          </p:nvCxnSpPr>
+          <p:spPr>
+            <a:xfrm flipV="1">
+              <a:off x="8574902" y="1309565"/>
+              <a:ext cx="1269723" cy="1377139"/>
+            </a:xfrm>
+            <a:prstGeom prst="bentConnector3">
+              <a:avLst/>
+            </a:prstGeom>
+            <a:grpFill/>
+            <a:ln w="57150">
+              <a:solidFill>
+                <a:schemeClr val="bg2">
+                  <a:lumMod val="75000"/>
+                </a:schemeClr>
+              </a:solidFill>
+              <a:tailEnd type="triangle"/>
+            </a:ln>
+          </p:spPr>
+          <p:style>
+            <a:lnRef idx="1">
+              <a:schemeClr val="accent1"/>
+            </a:lnRef>
+            <a:fillRef idx="0">
+              <a:schemeClr val="accent1"/>
+            </a:fillRef>
+            <a:effectRef idx="0">
+              <a:schemeClr val="accent1"/>
+            </a:effectRef>
+            <a:fontRef idx="minor">
+              <a:schemeClr val="tx1"/>
+            </a:fontRef>
+          </p:style>
+        </p:cxnSp>
+        <p:sp>
+          <p:nvSpPr>
+            <p:cNvPr id="104" name="TextBox 103">
+              <a:extLst>
+                <a:ext uri="{FF2B5EF4-FFF2-40B4-BE49-F238E27FC236}">
+                  <a16:creationId xmlns:a16="http://schemas.microsoft.com/office/drawing/2014/main" id="{1FA19259-4FE3-4763-A3B2-6BB2012E7E42}"/>
+                </a:ext>
+              </a:extLst>
+            </p:cNvPr>
+            <p:cNvSpPr txBox="1"/>
+            <p:nvPr/>
+          </p:nvSpPr>
+          <p:spPr>
+            <a:xfrm>
+              <a:off x="5047951" y="4656389"/>
+              <a:ext cx="2212657" cy="307777"/>
+            </a:xfrm>
+            <a:prstGeom prst="rect">
+              <a:avLst/>
+            </a:prstGeom>
+            <a:grpFill/>
+          </p:spPr>
+          <p:txBody>
+            <a:bodyPr wrap="none" rtlCol="0">
+              <a:spAutoFit/>
+            </a:bodyPr>
+            <a:lstStyle/>
+            <a:p>
+              <a:r>
+                <a:rPr lang="en-US" sz="1400" dirty="0"/>
+                <a:t>Reviewer rejects the article</a:t>
+              </a:r>
+            </a:p>
+          </p:txBody>
+        </p:sp>
+        <p:sp>
+          <p:nvSpPr>
+            <p:cNvPr id="105" name="TextBox 104">
+              <a:extLst>
+                <a:ext uri="{FF2B5EF4-FFF2-40B4-BE49-F238E27FC236}">
+                  <a16:creationId xmlns:a16="http://schemas.microsoft.com/office/drawing/2014/main" id="{D83302E0-C8E7-48F0-BAC8-A3E63A23F540}"/>
+                </a:ext>
+              </a:extLst>
+            </p:cNvPr>
+            <p:cNvSpPr txBox="1"/>
+            <p:nvPr/>
+          </p:nvSpPr>
+          <p:spPr>
+            <a:xfrm>
+              <a:off x="4669966" y="551838"/>
+              <a:ext cx="2397836" cy="307777"/>
+            </a:xfrm>
+            <a:prstGeom prst="rect">
+              <a:avLst/>
+            </a:prstGeom>
+            <a:grpFill/>
+          </p:spPr>
+          <p:txBody>
+            <a:bodyPr wrap="none" rtlCol="0">
+              <a:spAutoFit/>
+            </a:bodyPr>
+            <a:lstStyle/>
+            <a:p>
+              <a:r>
+                <a:rPr lang="en-US" sz="1400" dirty="0"/>
+                <a:t>Reviewer approves the article</a:t>
+              </a:r>
+            </a:p>
+          </p:txBody>
+        </p:sp>
+        <p:sp>
+          <p:nvSpPr>
+            <p:cNvPr id="106" name="TextBox 105">
+              <a:extLst>
+                <a:ext uri="{FF2B5EF4-FFF2-40B4-BE49-F238E27FC236}">
+                  <a16:creationId xmlns:a16="http://schemas.microsoft.com/office/drawing/2014/main" id="{07E346E5-7DF6-421D-BC1B-5D76EFEFE4E5}"/>
+                </a:ext>
+              </a:extLst>
+            </p:cNvPr>
+            <p:cNvSpPr txBox="1"/>
+            <p:nvPr/>
+          </p:nvSpPr>
+          <p:spPr>
+            <a:xfrm>
+              <a:off x="9258193" y="1718903"/>
+              <a:ext cx="1963871" cy="307777"/>
+            </a:xfrm>
+            <a:prstGeom prst="rect">
+              <a:avLst/>
+            </a:prstGeom>
+            <a:grpFill/>
+          </p:spPr>
+          <p:txBody>
+            <a:bodyPr wrap="none" rtlCol="0">
+              <a:spAutoFit/>
+            </a:bodyPr>
+            <a:lstStyle/>
+            <a:p>
+              <a:r>
+                <a:rPr lang="en-US" sz="1400" dirty="0"/>
+                <a:t>Publish article on portal</a:t>
+              </a:r>
+            </a:p>
+          </p:txBody>
+        </p:sp>
+        <p:sp>
+          <p:nvSpPr>
+            <p:cNvPr id="107" name="TextBox 106">
+              <a:extLst>
+                <a:ext uri="{FF2B5EF4-FFF2-40B4-BE49-F238E27FC236}">
+                  <a16:creationId xmlns:a16="http://schemas.microsoft.com/office/drawing/2014/main" id="{D6264838-842E-4C9F-920B-CFCFD340D2D3}"/>
+                </a:ext>
+              </a:extLst>
+            </p:cNvPr>
+            <p:cNvSpPr txBox="1"/>
+            <p:nvPr/>
+          </p:nvSpPr>
+          <p:spPr>
+            <a:xfrm>
+              <a:off x="9513843" y="4656897"/>
+              <a:ext cx="1875322" cy="307777"/>
+            </a:xfrm>
+            <a:prstGeom prst="rect">
+              <a:avLst/>
+            </a:prstGeom>
+            <a:grpFill/>
+          </p:spPr>
+          <p:txBody>
+            <a:bodyPr wrap="none" rtlCol="0">
+              <a:spAutoFit/>
+            </a:bodyPr>
+            <a:lstStyle/>
+            <a:p>
+              <a:r>
+                <a:rPr lang="en-US" sz="1400" dirty="0"/>
+                <a:t>Article available to use</a:t>
+              </a:r>
+            </a:p>
+          </p:txBody>
+        </p:sp>
+        <p:sp>
+          <p:nvSpPr>
+            <p:cNvPr id="122" name="TextBox 121">
+              <a:extLst>
+                <a:ext uri="{FF2B5EF4-FFF2-40B4-BE49-F238E27FC236}">
+                  <a16:creationId xmlns:a16="http://schemas.microsoft.com/office/drawing/2014/main" id="{103CADEB-C14F-45BC-83BB-585FA675F7F9}"/>
+                </a:ext>
+              </a:extLst>
+            </p:cNvPr>
+            <p:cNvSpPr txBox="1"/>
+            <p:nvPr/>
+          </p:nvSpPr>
+          <p:spPr>
+            <a:xfrm>
+              <a:off x="1747407" y="3486972"/>
+              <a:ext cx="499624" cy="276999"/>
+            </a:xfrm>
+            <a:prstGeom prst="rect">
+              <a:avLst/>
+            </a:prstGeom>
+            <a:grpFill/>
+          </p:spPr>
+          <p:txBody>
+            <a:bodyPr wrap="none" rtlCol="0">
+              <a:spAutoFit/>
+            </a:bodyPr>
+            <a:lstStyle/>
+            <a:p>
+              <a:r>
+                <a:rPr lang="en-US" sz="1200" dirty="0">
+                  <a:solidFill>
+                    <a:srgbClr val="0070C0"/>
+                  </a:solidFill>
+                </a:rPr>
+                <a:t>Draft</a:t>
+              </a:r>
+            </a:p>
+          </p:txBody>
+        </p:sp>
+        <p:sp>
+          <p:nvSpPr>
+            <p:cNvPr id="123" name="TextBox 122">
+              <a:extLst>
+                <a:ext uri="{FF2B5EF4-FFF2-40B4-BE49-F238E27FC236}">
+                  <a16:creationId xmlns:a16="http://schemas.microsoft.com/office/drawing/2014/main" id="{424E04AC-1CBA-424D-A20F-1ED60F044BC4}"/>
+                </a:ext>
+              </a:extLst>
+            </p:cNvPr>
+            <p:cNvSpPr txBox="1"/>
+            <p:nvPr/>
+          </p:nvSpPr>
+          <p:spPr>
+            <a:xfrm>
+              <a:off x="2545654" y="2290551"/>
+              <a:ext cx="1062086" cy="276999"/>
+            </a:xfrm>
+            <a:prstGeom prst="rect">
+              <a:avLst/>
+            </a:prstGeom>
+            <a:grpFill/>
+          </p:spPr>
+          <p:txBody>
+            <a:bodyPr wrap="none" rtlCol="0">
+              <a:spAutoFit/>
+            </a:bodyPr>
+            <a:lstStyle/>
+            <a:p>
+              <a:r>
+                <a:rPr lang="en-US" sz="1200" dirty="0">
+                  <a:solidFill>
+                    <a:srgbClr val="0070C0"/>
+                  </a:solidFill>
+                </a:rPr>
+                <a:t>Needs Review</a:t>
+              </a:r>
+            </a:p>
+          </p:txBody>
+        </p:sp>
+        <p:sp>
+          <p:nvSpPr>
+            <p:cNvPr id="124" name="TextBox 123">
+              <a:extLst>
+                <a:ext uri="{FF2B5EF4-FFF2-40B4-BE49-F238E27FC236}">
+                  <a16:creationId xmlns:a16="http://schemas.microsoft.com/office/drawing/2014/main" id="{31BF9B27-F342-4B8A-B553-1AAA28436708}"/>
+                </a:ext>
+              </a:extLst>
+            </p:cNvPr>
+            <p:cNvSpPr txBox="1"/>
+            <p:nvPr/>
+          </p:nvSpPr>
+          <p:spPr>
+            <a:xfrm>
+              <a:off x="5648697" y="2543025"/>
+              <a:ext cx="786369" cy="276999"/>
+            </a:xfrm>
+            <a:prstGeom prst="rect">
+              <a:avLst/>
+            </a:prstGeom>
+            <a:grpFill/>
+          </p:spPr>
+          <p:txBody>
+            <a:bodyPr wrap="none" rtlCol="0">
+              <a:spAutoFit/>
+            </a:bodyPr>
+            <a:lstStyle/>
+            <a:p>
+              <a:r>
+                <a:rPr lang="en-US" sz="1200" dirty="0">
+                  <a:solidFill>
+                    <a:srgbClr val="0070C0"/>
+                  </a:solidFill>
+                </a:rPr>
+                <a:t>In Review</a:t>
+              </a:r>
+            </a:p>
+          </p:txBody>
+        </p:sp>
+        <p:cxnSp>
+          <p:nvCxnSpPr>
+            <p:cNvPr id="127" name="Straight Arrow Connector 126">
+              <a:extLst>
+                <a:ext uri="{FF2B5EF4-FFF2-40B4-BE49-F238E27FC236}">
+                  <a16:creationId xmlns:a16="http://schemas.microsoft.com/office/drawing/2014/main" id="{B141A526-0141-4D85-8F46-24C17006B3BD}"/>
+                </a:ext>
+              </a:extLst>
+            </p:cNvPr>
+            <p:cNvCxnSpPr/>
+            <p:nvPr/>
+          </p:nvCxnSpPr>
+          <p:spPr>
+            <a:xfrm flipH="1">
+              <a:off x="3589692" y="4234760"/>
+              <a:ext cx="1962896" cy="0"/>
+            </a:xfrm>
+            <a:prstGeom prst="straightConnector1">
+              <a:avLst/>
+            </a:prstGeom>
+            <a:grpFill/>
+            <a:ln w="57150">
+              <a:solidFill>
+                <a:srgbClr val="AFABAB"/>
+              </a:solidFill>
+              <a:tailEnd type="triangle"/>
+            </a:ln>
+          </p:spPr>
+          <p:style>
+            <a:lnRef idx="1">
+              <a:schemeClr val="accent1"/>
+            </a:lnRef>
+            <a:fillRef idx="0">
+              <a:schemeClr val="accent1"/>
+            </a:fillRef>
+            <a:effectRef idx="0">
+              <a:schemeClr val="accent1"/>
+            </a:effectRef>
+            <a:fontRef idx="minor">
+              <a:schemeClr val="tx1"/>
+            </a:fontRef>
+          </p:style>
+        </p:cxnSp>
+      </p:grpSp>
+      <p:pic>
+        <p:nvPicPr>
+          <p:cNvPr id="71" name="Graphic 70" descr="Document">
+            <a:extLst>
+              <a:ext uri="{FF2B5EF4-FFF2-40B4-BE49-F238E27FC236}">
+                <a16:creationId xmlns:a16="http://schemas.microsoft.com/office/drawing/2014/main" id="{693DAB5E-AD7B-4514-B6E4-D11F7E18494D}"/>
+              </a:ext>
+            </a:extLst>
+          </p:cNvPr>
+          <p:cNvPicPr>
+            <a:picLocks noChangeAspect="1"/>
+          </p:cNvPicPr>
+          <p:nvPr/>
+        </p:nvPicPr>
+        <p:blipFill>
+          <a:blip r:embed="rId6">
+            <a:extLst>
+              <a:ext uri="{28A0092B-C50C-407E-A947-70E740481C1C}">
+                <a14:useLocalDpi xmlns:a14="http://schemas.microsoft.com/office/drawing/2010/main" val="0"/>
+              </a:ext>
+              <a:ext uri="{96DAC541-7B7A-43D3-8B79-37D633B846F1}">
+                <asvg:svgBlip xmlns:asvg="http://schemas.microsoft.com/office/drawing/2016/SVG/main" r:embed="rId7"/>
+              </a:ext>
+            </a:extLst>
+          </a:blip>
+          <a:stretch>
+            <a:fillRect/>
+          </a:stretch>
+        </p:blipFill>
+        <p:spPr>
+          <a:xfrm>
+            <a:off x="1688719" y="2249147"/>
+            <a:ext cx="914400" cy="914400"/>
+          </a:xfrm>
+          <a:prstGeom prst="rect">
+            <a:avLst/>
+          </a:prstGeom>
+          <a:scene3d>
+            <a:camera prst="isometricOffAxis2Left"/>
+            <a:lightRig rig="threePt" dir="t"/>
+          </a:scene3d>
+        </p:spPr>
+      </p:pic>
+      <p:pic>
+        <p:nvPicPr>
+          <p:cNvPr id="73" name="Graphic 72" descr="Glasses">
+            <a:extLst>
+              <a:ext uri="{FF2B5EF4-FFF2-40B4-BE49-F238E27FC236}">
+                <a16:creationId xmlns:a16="http://schemas.microsoft.com/office/drawing/2014/main" id="{11CBBD0E-FB50-4019-AAC9-CAB45FDDD630}"/>
+              </a:ext>
+            </a:extLst>
+          </p:cNvPr>
+          <p:cNvPicPr>
+            <a:picLocks noChangeAspect="1"/>
+          </p:cNvPicPr>
+          <p:nvPr/>
+        </p:nvPicPr>
+        <p:blipFill>
+          <a:blip r:embed="rId8">
+            <a:extLst>
+              <a:ext uri="{28A0092B-C50C-407E-A947-70E740481C1C}">
+                <a14:useLocalDpi xmlns:a14="http://schemas.microsoft.com/office/drawing/2010/main" val="0"/>
+              </a:ext>
+              <a:ext uri="{96DAC541-7B7A-43D3-8B79-37D633B846F1}">
+                <asvg:svgBlip xmlns:asvg="http://schemas.microsoft.com/office/drawing/2016/SVG/main" r:embed="rId9"/>
+              </a:ext>
+            </a:extLst>
+          </a:blip>
+          <a:stretch>
+            <a:fillRect/>
+          </a:stretch>
+        </p:blipFill>
+        <p:spPr>
+          <a:xfrm>
+            <a:off x="1254533" y="1975539"/>
+            <a:ext cx="914400" cy="914400"/>
+          </a:xfrm>
+          <a:prstGeom prst="rect">
+            <a:avLst/>
+          </a:prstGeom>
+          <a:scene3d>
+            <a:camera prst="isometricOffAxis2Left"/>
+            <a:lightRig rig="threePt" dir="t"/>
+          </a:scene3d>
+        </p:spPr>
+      </p:pic>
+      <p:sp>
+        <p:nvSpPr>
+          <p:cNvPr id="74" name="TextBox 73">
+            <a:extLst>
+              <a:ext uri="{FF2B5EF4-FFF2-40B4-BE49-F238E27FC236}">
+                <a16:creationId xmlns:a16="http://schemas.microsoft.com/office/drawing/2014/main" id="{973BA3FA-9C31-4846-AA4A-4206A826195A}"/>
+              </a:ext>
+            </a:extLst>
+          </p:cNvPr>
+          <p:cNvSpPr txBox="1"/>
+          <p:nvPr/>
+        </p:nvSpPr>
+        <p:spPr>
+          <a:xfrm>
+            <a:off x="1123521" y="1919165"/>
+            <a:ext cx="1845442" cy="307777"/>
+          </a:xfrm>
+          <a:prstGeom prst="rect">
+            <a:avLst/>
+          </a:prstGeom>
+          <a:noFill/>
+        </p:spPr>
+        <p:txBody>
+          <a:bodyPr wrap="none" rtlCol="0">
+            <a:spAutoFit/>
+          </a:bodyPr>
+          <a:lstStyle/>
+          <a:p>
+            <a:r>
+              <a:rPr lang="en-US" sz="1400" dirty="0"/>
+              <a:t>Mark article for review</a:t>
+            </a:r>
+          </a:p>
+        </p:txBody>
+      </p:sp>
+      <p:pic>
+        <p:nvPicPr>
+          <p:cNvPr id="75" name="Graphic 74" descr="Monitor">
+            <a:extLst>
+              <a:ext uri="{FF2B5EF4-FFF2-40B4-BE49-F238E27FC236}">
+                <a16:creationId xmlns:a16="http://schemas.microsoft.com/office/drawing/2014/main" id="{01AAE1AD-3CF3-4359-9A88-A542F74ED48D}"/>
+              </a:ext>
+            </a:extLst>
+          </p:cNvPr>
+          <p:cNvPicPr>
+            <a:picLocks noChangeAspect="1"/>
+          </p:cNvPicPr>
+          <p:nvPr/>
+        </p:nvPicPr>
+        <p:blipFill>
+          <a:blip r:embed="rId10">
+            <a:extLst>
+              <a:ext uri="{28A0092B-C50C-407E-A947-70E740481C1C}">
+                <a14:useLocalDpi xmlns:a14="http://schemas.microsoft.com/office/drawing/2010/main" val="0"/>
+              </a:ext>
+              <a:ext uri="{96DAC541-7B7A-43D3-8B79-37D633B846F1}">
+                <asvg:svgBlip xmlns:asvg="http://schemas.microsoft.com/office/drawing/2016/SVG/main" r:embed="rId11"/>
+              </a:ext>
+            </a:extLst>
+          </a:blip>
+          <a:stretch>
+            <a:fillRect/>
+          </a:stretch>
+        </p:blipFill>
+        <p:spPr>
+          <a:xfrm>
+            <a:off x="3160842" y="4028923"/>
+            <a:ext cx="411675" cy="411675"/>
+          </a:xfrm>
+          <a:prstGeom prst="rect">
+            <a:avLst/>
+          </a:prstGeom>
+          <a:scene3d>
+            <a:camera prst="isometricOffAxis2Left"/>
+            <a:lightRig rig="threePt" dir="t"/>
+          </a:scene3d>
+        </p:spPr>
+      </p:pic>
+      <p:pic>
+        <p:nvPicPr>
+          <p:cNvPr id="76" name="Graphic 75" descr="User">
+            <a:extLst>
+              <a:ext uri="{FF2B5EF4-FFF2-40B4-BE49-F238E27FC236}">
+                <a16:creationId xmlns:a16="http://schemas.microsoft.com/office/drawing/2014/main" id="{82C53CAA-6991-4C48-AB3D-A27D9D1F410B}"/>
+              </a:ext>
+            </a:extLst>
+          </p:cNvPr>
+          <p:cNvPicPr>
+            <a:picLocks noChangeAspect="1"/>
+          </p:cNvPicPr>
+          <p:nvPr/>
+        </p:nvPicPr>
+        <p:blipFill>
+          <a:blip r:embed="rId12">
+            <a:extLst>
+              <a:ext uri="{28A0092B-C50C-407E-A947-70E740481C1C}">
+                <a14:useLocalDpi xmlns:a14="http://schemas.microsoft.com/office/drawing/2010/main" val="0"/>
+              </a:ext>
+              <a:ext uri="{96DAC541-7B7A-43D3-8B79-37D633B846F1}">
+                <asvg:svgBlip xmlns:asvg="http://schemas.microsoft.com/office/drawing/2016/SVG/main" r:embed="rId13"/>
+              </a:ext>
+            </a:extLst>
+          </a:blip>
+          <a:stretch>
+            <a:fillRect/>
+          </a:stretch>
+        </p:blipFill>
+        <p:spPr>
+          <a:xfrm>
+            <a:off x="2459221" y="3777560"/>
+            <a:ext cx="914400" cy="914400"/>
+          </a:xfrm>
+          <a:prstGeom prst="rect">
+            <a:avLst/>
+          </a:prstGeom>
+          <a:scene3d>
+            <a:camera prst="isometricOffAxis2Left"/>
+            <a:lightRig rig="threePt" dir="t"/>
+          </a:scene3d>
+        </p:spPr>
+      </p:pic>
+      <p:pic>
+        <p:nvPicPr>
+          <p:cNvPr id="78" name="Graphic 77" descr="Monitor">
+            <a:extLst>
+              <a:ext uri="{FF2B5EF4-FFF2-40B4-BE49-F238E27FC236}">
+                <a16:creationId xmlns:a16="http://schemas.microsoft.com/office/drawing/2014/main" id="{242D6D52-46D1-40D6-AE00-E7C30E0E9C07}"/>
+              </a:ext>
+            </a:extLst>
+          </p:cNvPr>
+          <p:cNvPicPr>
+            <a:picLocks noChangeAspect="1"/>
+          </p:cNvPicPr>
+          <p:nvPr/>
+        </p:nvPicPr>
+        <p:blipFill>
+          <a:blip r:embed="rId10">
+            <a:extLst>
+              <a:ext uri="{28A0092B-C50C-407E-A947-70E740481C1C}">
+                <a14:useLocalDpi xmlns:a14="http://schemas.microsoft.com/office/drawing/2010/main" val="0"/>
+              </a:ext>
+              <a:ext uri="{96DAC541-7B7A-43D3-8B79-37D633B846F1}">
+                <asvg:svgBlip xmlns:asvg="http://schemas.microsoft.com/office/drawing/2016/SVG/main" r:embed="rId11"/>
+              </a:ext>
+            </a:extLst>
+          </a:blip>
+          <a:stretch>
+            <a:fillRect/>
+          </a:stretch>
+        </p:blipFill>
+        <p:spPr>
+          <a:xfrm>
+            <a:off x="1137836" y="4031194"/>
+            <a:ext cx="411675" cy="411675"/>
+          </a:xfrm>
+          <a:prstGeom prst="rect">
+            <a:avLst/>
+          </a:prstGeom>
+          <a:scene3d>
+            <a:camera prst="isometricOffAxis2Left"/>
+            <a:lightRig rig="threePt" dir="t"/>
+          </a:scene3d>
+        </p:spPr>
+      </p:pic>
+      <p:pic>
+        <p:nvPicPr>
+          <p:cNvPr id="85" name="Graphic 84" descr="User">
+            <a:extLst>
+              <a:ext uri="{FF2B5EF4-FFF2-40B4-BE49-F238E27FC236}">
+                <a16:creationId xmlns:a16="http://schemas.microsoft.com/office/drawing/2014/main" id="{B71111BA-A346-4011-B15D-98FD2FAC10AB}"/>
+              </a:ext>
+            </a:extLst>
+          </p:cNvPr>
+          <p:cNvPicPr>
+            <a:picLocks noChangeAspect="1"/>
+          </p:cNvPicPr>
+          <p:nvPr/>
+        </p:nvPicPr>
+        <p:blipFill>
+          <a:blip r:embed="rId12">
+            <a:extLst>
+              <a:ext uri="{28A0092B-C50C-407E-A947-70E740481C1C}">
+                <a14:useLocalDpi xmlns:a14="http://schemas.microsoft.com/office/drawing/2010/main" val="0"/>
+              </a:ext>
+              <a:ext uri="{96DAC541-7B7A-43D3-8B79-37D633B846F1}">
+                <asvg:svgBlip xmlns:asvg="http://schemas.microsoft.com/office/drawing/2016/SVG/main" r:embed="rId13"/>
+              </a:ext>
+            </a:extLst>
+          </a:blip>
+          <a:stretch>
+            <a:fillRect/>
+          </a:stretch>
+        </p:blipFill>
+        <p:spPr>
+          <a:xfrm>
+            <a:off x="436215" y="3779831"/>
+            <a:ext cx="914400" cy="914400"/>
+          </a:xfrm>
+          <a:prstGeom prst="rect">
+            <a:avLst/>
+          </a:prstGeom>
+          <a:scene3d>
+            <a:camera prst="isometricOffAxis2Left"/>
+            <a:lightRig rig="threePt" dir="t"/>
+          </a:scene3d>
+        </p:spPr>
+      </p:pic>
+      <p:pic>
+        <p:nvPicPr>
+          <p:cNvPr id="86" name="Graphic 85" descr="Document">
+            <a:extLst>
+              <a:ext uri="{FF2B5EF4-FFF2-40B4-BE49-F238E27FC236}">
+                <a16:creationId xmlns:a16="http://schemas.microsoft.com/office/drawing/2014/main" id="{02D09EFC-B39F-412D-A0C0-CB90CB885486}"/>
+              </a:ext>
+            </a:extLst>
+          </p:cNvPr>
+          <p:cNvPicPr>
+            <a:picLocks noChangeAspect="1"/>
+          </p:cNvPicPr>
+          <p:nvPr/>
+        </p:nvPicPr>
+        <p:blipFill>
+          <a:blip r:embed="rId14">
+            <a:extLst>
+              <a:ext uri="{28A0092B-C50C-407E-A947-70E740481C1C}">
+                <a14:useLocalDpi xmlns:a14="http://schemas.microsoft.com/office/drawing/2010/main" val="0"/>
+              </a:ext>
+              <a:ext uri="{96DAC541-7B7A-43D3-8B79-37D633B846F1}">
+                <asvg:svgBlip xmlns:asvg="http://schemas.microsoft.com/office/drawing/2016/SVG/main" r:embed="rId15"/>
+              </a:ext>
+            </a:extLst>
+          </a:blip>
+          <a:stretch>
+            <a:fillRect/>
+          </a:stretch>
+        </p:blipFill>
+        <p:spPr>
+          <a:xfrm>
+            <a:off x="5552588" y="873746"/>
+            <a:ext cx="914400" cy="914400"/>
+          </a:xfrm>
+          <a:prstGeom prst="rect">
+            <a:avLst/>
+          </a:prstGeom>
+          <a:scene3d>
+            <a:camera prst="isometricOffAxis2Left"/>
+            <a:lightRig rig="threePt" dir="t"/>
+          </a:scene3d>
+        </p:spPr>
+      </p:pic>
+      <p:sp>
+        <p:nvSpPr>
+          <p:cNvPr id="88" name="TextBox 87">
+            <a:extLst>
+              <a:ext uri="{FF2B5EF4-FFF2-40B4-BE49-F238E27FC236}">
+                <a16:creationId xmlns:a16="http://schemas.microsoft.com/office/drawing/2014/main" id="{FCE716AB-3222-4479-8EB4-1907D89513E5}"/>
+              </a:ext>
+            </a:extLst>
+          </p:cNvPr>
+          <p:cNvSpPr txBox="1"/>
+          <p:nvPr/>
+        </p:nvSpPr>
+        <p:spPr>
+          <a:xfrm>
+            <a:off x="4200526" y="2208846"/>
+            <a:ext cx="1162050" cy="954107"/>
+          </a:xfrm>
+          <a:prstGeom prst="rect">
+            <a:avLst/>
+          </a:prstGeom>
+          <a:solidFill>
+            <a:schemeClr val="accent1"/>
+          </a:solidFill>
+        </p:spPr>
+        <p:txBody>
+          <a:bodyPr wrap="square" rtlCol="0">
+            <a:spAutoFit/>
+          </a:bodyPr>
+          <a:lstStyle/>
+          <a:p>
+            <a:pPr algn="r"/>
+            <a:r>
+              <a:rPr lang="en-US" sz="1400" dirty="0">
+                <a:solidFill>
+                  <a:schemeClr val="bg1"/>
+                </a:solidFill>
+              </a:rPr>
+              <a:t>Reviewer picks the article for review</a:t>
+            </a:r>
+          </a:p>
+        </p:txBody>
+      </p:sp>
+      <p:sp>
+        <p:nvSpPr>
+          <p:cNvPr id="89" name="Oval 88">
+            <a:extLst>
+              <a:ext uri="{FF2B5EF4-FFF2-40B4-BE49-F238E27FC236}">
+                <a16:creationId xmlns:a16="http://schemas.microsoft.com/office/drawing/2014/main" id="{03F339B7-4554-41A0-8018-22AD0DA9C812}"/>
+              </a:ext>
+            </a:extLst>
+          </p:cNvPr>
+          <p:cNvSpPr/>
+          <p:nvPr/>
+        </p:nvSpPr>
+        <p:spPr>
+          <a:xfrm>
+            <a:off x="3857625" y="2345909"/>
+            <a:ext cx="638175" cy="638175"/>
+          </a:xfrm>
+          <a:prstGeom prst="ellipse">
+            <a:avLst/>
+          </a:prstGeom>
+        </p:spPr>
+        <p:style>
+          <a:lnRef idx="2">
+            <a:schemeClr val="accent1">
+              <a:shade val="50000"/>
+            </a:schemeClr>
+          </a:lnRef>
+          <a:fillRef idx="1">
+            <a:schemeClr val="accent1"/>
+          </a:fillRef>
+          <a:effectRef idx="0">
+            <a:schemeClr val="accent1"/>
+          </a:effectRef>
+          <a:fontRef idx="minor">
+            <a:schemeClr val="lt1"/>
+          </a:fontRef>
+        </p:style>
+        <p:txBody>
+          <a:bodyPr rtlCol="0" anchor="ctr"/>
+          <a:lstStyle/>
+          <a:p>
+            <a:pPr algn="ctr"/>
+            <a:endParaRPr lang="en-US"/>
+          </a:p>
+        </p:txBody>
+      </p:sp>
+      <p:pic>
+        <p:nvPicPr>
+          <p:cNvPr id="90" name="Graphic 89" descr="User">
+            <a:extLst>
+              <a:ext uri="{FF2B5EF4-FFF2-40B4-BE49-F238E27FC236}">
+                <a16:creationId xmlns:a16="http://schemas.microsoft.com/office/drawing/2014/main" id="{4B973626-607A-4D62-9B06-D93C9FC87885}"/>
+              </a:ext>
+            </a:extLst>
+          </p:cNvPr>
+          <p:cNvPicPr>
+            <a:picLocks noChangeAspect="1"/>
+          </p:cNvPicPr>
+          <p:nvPr/>
+        </p:nvPicPr>
+        <p:blipFill>
+          <a:blip r:embed="rId16">
+            <a:extLst>
+              <a:ext uri="{28A0092B-C50C-407E-A947-70E740481C1C}">
+                <a14:useLocalDpi xmlns:a14="http://schemas.microsoft.com/office/drawing/2010/main" val="0"/>
+              </a:ext>
+              <a:ext uri="{96DAC541-7B7A-43D3-8B79-37D633B846F1}">
+                <asvg:svgBlip xmlns:asvg="http://schemas.microsoft.com/office/drawing/2016/SVG/main" r:embed="rId17"/>
+              </a:ext>
+            </a:extLst>
+          </a:blip>
+          <a:stretch>
+            <a:fillRect/>
+          </a:stretch>
+        </p:blipFill>
+        <p:spPr>
+          <a:xfrm>
+            <a:off x="4010126" y="2453785"/>
+            <a:ext cx="476251" cy="476251"/>
+          </a:xfrm>
+          <a:prstGeom prst="rect">
+            <a:avLst/>
+          </a:prstGeom>
+        </p:spPr>
+      </p:pic>
+      <p:sp>
+        <p:nvSpPr>
+          <p:cNvPr id="92" name="Oval 91">
+            <a:extLst>
+              <a:ext uri="{FF2B5EF4-FFF2-40B4-BE49-F238E27FC236}">
+                <a16:creationId xmlns:a16="http://schemas.microsoft.com/office/drawing/2014/main" id="{FD7A1979-18AD-417A-8F2E-94870DA25883}"/>
+              </a:ext>
+            </a:extLst>
+          </p:cNvPr>
+          <p:cNvSpPr/>
+          <p:nvPr/>
+        </p:nvSpPr>
+        <p:spPr>
+          <a:xfrm>
+            <a:off x="7031851" y="2346713"/>
+            <a:ext cx="638175" cy="638175"/>
+          </a:xfrm>
+          <a:prstGeom prst="ellipse">
+            <a:avLst/>
+          </a:prstGeom>
+        </p:spPr>
+        <p:style>
+          <a:lnRef idx="2">
+            <a:schemeClr val="accent1">
+              <a:shade val="50000"/>
+            </a:schemeClr>
+          </a:lnRef>
+          <a:fillRef idx="1">
+            <a:schemeClr val="accent1"/>
+          </a:fillRef>
+          <a:effectRef idx="0">
+            <a:schemeClr val="accent1"/>
+          </a:effectRef>
+          <a:fontRef idx="minor">
+            <a:schemeClr val="lt1"/>
+          </a:fontRef>
+        </p:style>
+        <p:txBody>
+          <a:bodyPr rtlCol="0" anchor="ctr"/>
+          <a:lstStyle/>
+          <a:p>
+            <a:pPr algn="ctr"/>
+            <a:endParaRPr lang="en-US" dirty="0"/>
+          </a:p>
+        </p:txBody>
+      </p:sp>
+      <p:sp>
+        <p:nvSpPr>
+          <p:cNvPr id="93" name="TextBox 92">
+            <a:extLst>
+              <a:ext uri="{FF2B5EF4-FFF2-40B4-BE49-F238E27FC236}">
+                <a16:creationId xmlns:a16="http://schemas.microsoft.com/office/drawing/2014/main" id="{0A65A9D8-A8A6-4001-8842-86F18AA4C1CB}"/>
+              </a:ext>
+            </a:extLst>
+          </p:cNvPr>
+          <p:cNvSpPr txBox="1"/>
+          <p:nvPr/>
+        </p:nvSpPr>
+        <p:spPr>
+          <a:xfrm>
+            <a:off x="7374752" y="2209650"/>
+            <a:ext cx="1162050" cy="954107"/>
+          </a:xfrm>
+          <a:prstGeom prst="rect">
+            <a:avLst/>
+          </a:prstGeom>
+          <a:solidFill>
+            <a:schemeClr val="accent1"/>
+          </a:solidFill>
+        </p:spPr>
+        <p:txBody>
+          <a:bodyPr wrap="square" rtlCol="0">
+            <a:spAutoFit/>
+          </a:bodyPr>
+          <a:lstStyle/>
+          <a:p>
+            <a:pPr algn="r"/>
+            <a:r>
+              <a:rPr lang="en-US" sz="1400" dirty="0">
+                <a:solidFill>
+                  <a:schemeClr val="bg1"/>
+                </a:solidFill>
+              </a:rPr>
+              <a:t>Mark the article for translation</a:t>
+            </a:r>
+          </a:p>
+          <a:p>
+            <a:pPr algn="r"/>
+            <a:endParaRPr lang="en-US" sz="1400" dirty="0">
+              <a:solidFill>
+                <a:schemeClr val="bg1"/>
+              </a:solidFill>
+            </a:endParaRPr>
+          </a:p>
+        </p:txBody>
+      </p:sp>
+      <p:pic>
+        <p:nvPicPr>
+          <p:cNvPr id="95" name="Graphic 94" descr="Document">
+            <a:extLst>
+              <a:ext uri="{FF2B5EF4-FFF2-40B4-BE49-F238E27FC236}">
+                <a16:creationId xmlns:a16="http://schemas.microsoft.com/office/drawing/2014/main" id="{D27F091D-36BC-44AC-820A-DEA77DC83B6E}"/>
+              </a:ext>
+            </a:extLst>
+          </p:cNvPr>
+          <p:cNvPicPr>
+            <a:picLocks noChangeAspect="1"/>
+          </p:cNvPicPr>
+          <p:nvPr/>
+        </p:nvPicPr>
+        <p:blipFill>
+          <a:blip r:embed="rId18">
+            <a:extLst>
+              <a:ext uri="{28A0092B-C50C-407E-A947-70E740481C1C}">
+                <a14:useLocalDpi xmlns:a14="http://schemas.microsoft.com/office/drawing/2010/main" val="0"/>
+              </a:ext>
+              <a:ext uri="{96DAC541-7B7A-43D3-8B79-37D633B846F1}">
+                <asvg:svgBlip xmlns:asvg="http://schemas.microsoft.com/office/drawing/2016/SVG/main" r:embed="rId19"/>
+              </a:ext>
+            </a:extLst>
+          </a:blip>
+          <a:stretch>
+            <a:fillRect/>
+          </a:stretch>
+        </p:blipFill>
+        <p:spPr>
+          <a:xfrm>
+            <a:off x="7092728" y="2415512"/>
+            <a:ext cx="394363" cy="394363"/>
+          </a:xfrm>
+          <a:prstGeom prst="rect">
+            <a:avLst/>
+          </a:prstGeom>
+        </p:spPr>
+      </p:pic>
+      <p:pic>
+        <p:nvPicPr>
+          <p:cNvPr id="100" name="Graphic 99" descr="Checkmark">
+            <a:extLst>
+              <a:ext uri="{FF2B5EF4-FFF2-40B4-BE49-F238E27FC236}">
+                <a16:creationId xmlns:a16="http://schemas.microsoft.com/office/drawing/2014/main" id="{67F25ED1-A3D7-495C-8DAB-94FA4585222E}"/>
+              </a:ext>
+            </a:extLst>
+          </p:cNvPr>
+          <p:cNvPicPr>
+            <a:picLocks noChangeAspect="1"/>
+          </p:cNvPicPr>
+          <p:nvPr/>
+        </p:nvPicPr>
+        <p:blipFill>
+          <a:blip r:embed="rId20">
+            <a:extLst>
+              <a:ext uri="{28A0092B-C50C-407E-A947-70E740481C1C}">
+                <a14:useLocalDpi xmlns:a14="http://schemas.microsoft.com/office/drawing/2010/main" val="0"/>
+              </a:ext>
+              <a:ext uri="{96DAC541-7B7A-43D3-8B79-37D633B846F1}">
+                <asvg:svgBlip xmlns:asvg="http://schemas.microsoft.com/office/drawing/2016/SVG/main" r:embed="rId21"/>
+              </a:ext>
+            </a:extLst>
+          </a:blip>
+          <a:stretch>
+            <a:fillRect/>
+          </a:stretch>
+        </p:blipFill>
+        <p:spPr>
+          <a:xfrm>
+            <a:off x="6038362" y="1316815"/>
+            <a:ext cx="561976" cy="561976"/>
+          </a:xfrm>
+          <a:prstGeom prst="rect">
+            <a:avLst/>
+          </a:prstGeom>
+        </p:spPr>
+      </p:pic>
+      <p:pic>
+        <p:nvPicPr>
+          <p:cNvPr id="108" name="Graphic 107" descr="Close">
+            <a:extLst>
+              <a:ext uri="{FF2B5EF4-FFF2-40B4-BE49-F238E27FC236}">
+                <a16:creationId xmlns:a16="http://schemas.microsoft.com/office/drawing/2014/main" id="{A75AD67E-F6D8-4F28-B2EC-6621DEB5BFB2}"/>
+              </a:ext>
+            </a:extLst>
+          </p:cNvPr>
+          <p:cNvPicPr>
+            <a:picLocks noChangeAspect="1"/>
+          </p:cNvPicPr>
+          <p:nvPr/>
+        </p:nvPicPr>
+        <p:blipFill>
+          <a:blip r:embed="rId22">
+            <a:extLst>
+              <a:ext uri="{28A0092B-C50C-407E-A947-70E740481C1C}">
+                <a14:useLocalDpi xmlns:a14="http://schemas.microsoft.com/office/drawing/2010/main" val="0"/>
+              </a:ext>
+              <a:ext uri="{96DAC541-7B7A-43D3-8B79-37D633B846F1}">
+                <asvg:svgBlip xmlns:asvg="http://schemas.microsoft.com/office/drawing/2016/SVG/main" r:embed="rId23"/>
+              </a:ext>
+            </a:extLst>
+          </a:blip>
+          <a:stretch>
+            <a:fillRect/>
+          </a:stretch>
+        </p:blipFill>
+        <p:spPr>
+          <a:xfrm>
+            <a:off x="5993872" y="4131035"/>
+            <a:ext cx="561975" cy="561975"/>
+          </a:xfrm>
+          <a:prstGeom prst="rect">
+            <a:avLst/>
+          </a:prstGeom>
+        </p:spPr>
+      </p:pic>
+      <p:pic>
+        <p:nvPicPr>
+          <p:cNvPr id="109" name="Graphic 108" descr="Monitor">
+            <a:extLst>
+              <a:ext uri="{FF2B5EF4-FFF2-40B4-BE49-F238E27FC236}">
+                <a16:creationId xmlns:a16="http://schemas.microsoft.com/office/drawing/2014/main" id="{3A0B8FA0-8F4A-493C-94D1-0F9AF20DDB44}"/>
+              </a:ext>
+            </a:extLst>
+          </p:cNvPr>
+          <p:cNvPicPr>
+            <a:picLocks noChangeAspect="1"/>
+          </p:cNvPicPr>
+          <p:nvPr/>
+        </p:nvPicPr>
+        <p:blipFill>
+          <a:blip r:embed="rId10">
+            <a:extLst>
+              <a:ext uri="{28A0092B-C50C-407E-A947-70E740481C1C}">
+                <a14:useLocalDpi xmlns:a14="http://schemas.microsoft.com/office/drawing/2010/main" val="0"/>
+              </a:ext>
+              <a:ext uri="{96DAC541-7B7A-43D3-8B79-37D633B846F1}">
+                <asvg:svgBlip xmlns:asvg="http://schemas.microsoft.com/office/drawing/2016/SVG/main" r:embed="rId11"/>
+              </a:ext>
+            </a:extLst>
+          </a:blip>
+          <a:stretch>
+            <a:fillRect/>
+          </a:stretch>
+        </p:blipFill>
+        <p:spPr>
+          <a:xfrm>
+            <a:off x="9806525" y="852365"/>
+            <a:ext cx="914400" cy="914400"/>
+          </a:xfrm>
+          <a:prstGeom prst="rect">
+            <a:avLst/>
+          </a:prstGeom>
+        </p:spPr>
+      </p:pic>
+      <p:pic>
+        <p:nvPicPr>
+          <p:cNvPr id="110" name="Graphic 109" descr="Call center">
+            <a:extLst>
+              <a:ext uri="{FF2B5EF4-FFF2-40B4-BE49-F238E27FC236}">
+                <a16:creationId xmlns:a16="http://schemas.microsoft.com/office/drawing/2014/main" id="{97CA9162-F42B-4D4E-B403-08630956AC15}"/>
+              </a:ext>
+            </a:extLst>
+          </p:cNvPr>
+          <p:cNvPicPr>
+            <a:picLocks noChangeAspect="1"/>
+          </p:cNvPicPr>
+          <p:nvPr/>
+        </p:nvPicPr>
+        <p:blipFill>
+          <a:blip r:embed="rId24">
+            <a:extLst>
+              <a:ext uri="{28A0092B-C50C-407E-A947-70E740481C1C}">
+                <a14:useLocalDpi xmlns:a14="http://schemas.microsoft.com/office/drawing/2010/main" val="0"/>
+              </a:ext>
+              <a:ext uri="{96DAC541-7B7A-43D3-8B79-37D633B846F1}">
+                <asvg:svgBlip xmlns:asvg="http://schemas.microsoft.com/office/drawing/2016/SVG/main" r:embed="rId25"/>
+              </a:ext>
+            </a:extLst>
+          </a:blip>
+          <a:stretch>
+            <a:fillRect/>
+          </a:stretch>
+        </p:blipFill>
+        <p:spPr>
+          <a:xfrm>
+            <a:off x="9881930" y="3728886"/>
+            <a:ext cx="914400" cy="914400"/>
+          </a:xfrm>
+          <a:prstGeom prst="rect">
+            <a:avLst/>
+          </a:prstGeom>
+          <a:scene3d>
+            <a:camera prst="isometricOffAxis2Left"/>
+            <a:lightRig rig="threePt" dir="t"/>
+          </a:scene3d>
+        </p:spPr>
+      </p:pic>
+      <p:pic>
+        <p:nvPicPr>
+          <p:cNvPr id="111" name="Graphic 110" descr="Monitor">
+            <a:extLst>
+              <a:ext uri="{FF2B5EF4-FFF2-40B4-BE49-F238E27FC236}">
+                <a16:creationId xmlns:a16="http://schemas.microsoft.com/office/drawing/2014/main" id="{C1D2082B-932C-4226-BBB4-AD07DB32052E}"/>
+              </a:ext>
+            </a:extLst>
+          </p:cNvPr>
+          <p:cNvPicPr>
+            <a:picLocks noChangeAspect="1"/>
+          </p:cNvPicPr>
+          <p:nvPr/>
+        </p:nvPicPr>
+        <p:blipFill>
+          <a:blip r:embed="rId10">
+            <a:extLst>
+              <a:ext uri="{28A0092B-C50C-407E-A947-70E740481C1C}">
+                <a14:useLocalDpi xmlns:a14="http://schemas.microsoft.com/office/drawing/2010/main" val="0"/>
+              </a:ext>
+              <a:ext uri="{96DAC541-7B7A-43D3-8B79-37D633B846F1}">
+                <asvg:svgBlip xmlns:asvg="http://schemas.microsoft.com/office/drawing/2016/SVG/main" r:embed="rId11"/>
+              </a:ext>
+            </a:extLst>
+          </a:blip>
+          <a:stretch>
+            <a:fillRect/>
+          </a:stretch>
+        </p:blipFill>
+        <p:spPr>
+          <a:xfrm>
+            <a:off x="10590492" y="4000348"/>
+            <a:ext cx="411675" cy="411675"/>
+          </a:xfrm>
+          <a:prstGeom prst="rect">
+            <a:avLst/>
+          </a:prstGeom>
+          <a:scene3d>
+            <a:camera prst="isometricOffAxis2Left"/>
+            <a:lightRig rig="threePt" dir="t"/>
+          </a:scene3d>
+        </p:spPr>
+      </p:pic>
+      <p:pic>
+        <p:nvPicPr>
+          <p:cNvPr id="112" name="Graphic 111" descr="World">
+            <a:extLst>
+              <a:ext uri="{FF2B5EF4-FFF2-40B4-BE49-F238E27FC236}">
+                <a16:creationId xmlns:a16="http://schemas.microsoft.com/office/drawing/2014/main" id="{9D1D37E8-8F28-40E0-BCAD-801D2FF378B9}"/>
+              </a:ext>
+            </a:extLst>
+          </p:cNvPr>
+          <p:cNvPicPr>
+            <a:picLocks noChangeAspect="1"/>
+          </p:cNvPicPr>
+          <p:nvPr/>
+        </p:nvPicPr>
+        <p:blipFill>
+          <a:blip r:embed="rId26">
+            <a:extLst>
+              <a:ext uri="{28A0092B-C50C-407E-A947-70E740481C1C}">
+                <a14:useLocalDpi xmlns:a14="http://schemas.microsoft.com/office/drawing/2010/main" val="0"/>
+              </a:ext>
+              <a:ext uri="{96DAC541-7B7A-43D3-8B79-37D633B846F1}">
+                <asvg:svgBlip xmlns:asvg="http://schemas.microsoft.com/office/drawing/2016/SVG/main" r:embed="rId27"/>
+              </a:ext>
+            </a:extLst>
+          </a:blip>
+          <a:stretch>
+            <a:fillRect/>
+          </a:stretch>
+        </p:blipFill>
+        <p:spPr>
+          <a:xfrm>
+            <a:off x="10393131" y="1208220"/>
+            <a:ext cx="489030" cy="491094"/>
+          </a:xfrm>
+          <a:prstGeom prst="rect">
+            <a:avLst/>
+          </a:prstGeom>
+        </p:spPr>
+      </p:pic>
+      <p:pic>
+        <p:nvPicPr>
+          <p:cNvPr id="113" name="Graphic 112" descr="Document">
+            <a:extLst>
+              <a:ext uri="{FF2B5EF4-FFF2-40B4-BE49-F238E27FC236}">
+                <a16:creationId xmlns:a16="http://schemas.microsoft.com/office/drawing/2014/main" id="{4E257C7C-B559-4BB7-9249-F0057E36DBFA}"/>
+              </a:ext>
+            </a:extLst>
+          </p:cNvPr>
+          <p:cNvPicPr>
+            <a:picLocks noChangeAspect="1"/>
+          </p:cNvPicPr>
+          <p:nvPr/>
+        </p:nvPicPr>
+        <p:blipFill>
+          <a:blip r:embed="rId14">
+            <a:extLst>
+              <a:ext uri="{28A0092B-C50C-407E-A947-70E740481C1C}">
+                <a14:useLocalDpi xmlns:a14="http://schemas.microsoft.com/office/drawing/2010/main" val="0"/>
+              </a:ext>
+              <a:ext uri="{96DAC541-7B7A-43D3-8B79-37D633B846F1}">
+                <asvg:svgBlip xmlns:asvg="http://schemas.microsoft.com/office/drawing/2016/SVG/main" r:embed="rId15"/>
+              </a:ext>
+            </a:extLst>
+          </a:blip>
+          <a:stretch>
+            <a:fillRect/>
+          </a:stretch>
+        </p:blipFill>
+        <p:spPr>
+          <a:xfrm>
+            <a:off x="5553768" y="3520661"/>
+            <a:ext cx="914400" cy="914400"/>
+          </a:xfrm>
+          <a:prstGeom prst="rect">
+            <a:avLst/>
+          </a:prstGeom>
+          <a:scene3d>
+            <a:camera prst="isometricOffAxis2Left"/>
+            <a:lightRig rig="threePt" dir="t"/>
+          </a:scene3d>
+        </p:spPr>
+      </p:pic>
+    </p:spTree>
+    <p:extLst>
+      <p:ext uri="{BB962C8B-B14F-4D97-AF65-F5344CB8AC3E}">
+        <p14:creationId xmlns:p14="http://schemas.microsoft.com/office/powerpoint/2010/main" val="1062753720"/>
+      </p:ext>
+    </p:extLst>
+  </p:cSld>
+  <p:clrMapOvr>
+    <a:masterClrMapping/>
+  </p:clrMapOvr>
+</p:sld>
+</file>
+
+<file path=ppt/slides/slide3.xml><?xml version="1.0" encoding="utf-8"?>
+<p:sld xmlns:a="http://schemas.openxmlformats.org/drawingml/2006/main" xmlns:r="http://schemas.openxmlformats.org/officeDocument/2006/relationships" xmlns:p="http://schemas.openxmlformats.org/presentationml/2006/main">
+  <p:cSld>
+    <p:spTree>
+      <p:nvGrpSpPr>
+        <p:cNvPr id="1" name=""/>
+        <p:cNvGrpSpPr/>
+        <p:nvPr/>
+      </p:nvGrpSpPr>
+      <p:grpSpPr>
+        <a:xfrm>
+          <a:off x="0" y="0"/>
+          <a:ext cx="0" cy="0"/>
+          <a:chOff x="0" y="0"/>
+          <a:chExt cx="0" cy="0"/>
+        </a:xfrm>
+      </p:grpSpPr>
       <p:pic>
         <p:nvPicPr>
           <p:cNvPr id="4" name="Picture 3">
@@ -8580,7 +10561,7 @@
 </p:sld>
 </file>
 
-<file path=ppt/slides/slide3.xml><?xml version="1.0" encoding="utf-8"?>
+<file path=ppt/slides/slide4.xml><?xml version="1.0" encoding="utf-8"?>
 <p:sld xmlns:a="http://schemas.openxmlformats.org/drawingml/2006/main" xmlns:r="http://schemas.openxmlformats.org/officeDocument/2006/relationships" xmlns:p="http://schemas.openxmlformats.org/presentationml/2006/main">
   <p:cSld>
     <p:spTree>
@@ -8882,7 +10863,7 @@
 </p:sld>
 </file>
 
-<file path=ppt/slides/slide4.xml><?xml version="1.0" encoding="utf-8"?>
+<file path=ppt/slides/slide5.xml><?xml version="1.0" encoding="utf-8"?>
 <p:sld xmlns:a="http://schemas.openxmlformats.org/drawingml/2006/main" xmlns:r="http://schemas.openxmlformats.org/officeDocument/2006/relationships" xmlns:p="http://schemas.openxmlformats.org/presentationml/2006/main">
   <p:cSld>
     <p:spTree>
@@ -9051,7 +11032,7 @@
 </p:sld>
 </file>
 
-<file path=ppt/slides/slide5.xml><?xml version="1.0" encoding="utf-8"?>
+<file path=ppt/slides/slide6.xml><?xml version="1.0" encoding="utf-8"?>
 <p:sld xmlns:a="http://schemas.openxmlformats.org/drawingml/2006/main" xmlns:r="http://schemas.openxmlformats.org/officeDocument/2006/relationships" xmlns:p="http://schemas.openxmlformats.org/presentationml/2006/main">
   <p:cSld>
     <p:spTree>
@@ -9335,7 +11316,7 @@
 </p:sld>
 </file>
 
-<file path=ppt/slides/slide6.xml><?xml version="1.0" encoding="utf-8"?>
+<file path=ppt/slides/slide7.xml><?xml version="1.0" encoding="utf-8"?>
 <p:sld xmlns:a="http://schemas.openxmlformats.org/drawingml/2006/main" xmlns:r="http://schemas.openxmlformats.org/officeDocument/2006/relationships" xmlns:p="http://schemas.openxmlformats.org/presentationml/2006/main">
   <p:cSld>
     <p:spTree>
@@ -9455,7 +11436,7 @@
 </p:sld>
 </file>
 
-<file path=ppt/slides/slide7.xml><?xml version="1.0" encoding="utf-8"?>
+<file path=ppt/slides/slide8.xml><?xml version="1.0" encoding="utf-8"?>
 <p:sld xmlns:a="http://schemas.openxmlformats.org/drawingml/2006/main" xmlns:r="http://schemas.openxmlformats.org/officeDocument/2006/relationships" xmlns:p="http://schemas.openxmlformats.org/presentationml/2006/main">
   <p:cSld>
     <p:spTree>
@@ -9515,7 +11496,7 @@
 </p:sld>
 </file>
 
-<file path=ppt/slides/slide8.xml><?xml version="1.0" encoding="utf-8"?>
+<file path=ppt/slides/slide9.xml><?xml version="1.0" encoding="utf-8"?>
 <p:sld xmlns:a="http://schemas.openxmlformats.org/drawingml/2006/main" xmlns:r="http://schemas.openxmlformats.org/officeDocument/2006/relationships" xmlns:p="http://schemas.openxmlformats.org/presentationml/2006/main">
   <p:cSld>
     <p:spTree>
@@ -9566,66 +11547,6 @@
     <p:extLst>
       <p:ext uri="{BB962C8B-B14F-4D97-AF65-F5344CB8AC3E}">
         <p14:creationId xmlns:p14="http://schemas.microsoft.com/office/powerpoint/2010/main" val="526606861"/>
-      </p:ext>
-    </p:extLst>
-  </p:cSld>
-  <p:clrMapOvr>
-    <a:masterClrMapping/>
-  </p:clrMapOvr>
-</p:sld>
-</file>
-
-<file path=ppt/slides/slide9.xml><?xml version="1.0" encoding="utf-8"?>
-<p:sld xmlns:a="http://schemas.openxmlformats.org/drawingml/2006/main" xmlns:r="http://schemas.openxmlformats.org/officeDocument/2006/relationships" xmlns:p="http://schemas.openxmlformats.org/presentationml/2006/main">
-  <p:cSld>
-    <p:spTree>
-      <p:nvGrpSpPr>
-        <p:cNvPr id="1" name=""/>
-        <p:cNvGrpSpPr/>
-        <p:nvPr/>
-      </p:nvGrpSpPr>
-      <p:grpSpPr>
-        <a:xfrm>
-          <a:off x="0" y="0"/>
-          <a:ext cx="0" cy="0"/>
-          <a:chOff x="0" y="0"/>
-          <a:chExt cx="0" cy="0"/>
-        </a:xfrm>
-      </p:grpSpPr>
-      <p:pic>
-        <p:nvPicPr>
-          <p:cNvPr id="4" name="Picture 3">
-            <a:extLst>
-              <a:ext uri="{FF2B5EF4-FFF2-40B4-BE49-F238E27FC236}">
-                <a16:creationId xmlns:a16="http://schemas.microsoft.com/office/drawing/2014/main" id="{20748983-A362-4542-B444-253429BF1F41}"/>
-              </a:ext>
-            </a:extLst>
-          </p:cNvPr>
-          <p:cNvPicPr>
-            <a:picLocks noChangeAspect="1"/>
-          </p:cNvPicPr>
-          <p:nvPr/>
-        </p:nvPicPr>
-        <p:blipFill>
-          <a:blip r:embed="rId2"/>
-          <a:stretch>
-            <a:fillRect/>
-          </a:stretch>
-        </p:blipFill>
-        <p:spPr>
-          <a:xfrm>
-            <a:off x="3200762" y="867095"/>
-            <a:ext cx="5790476" cy="5123809"/>
-          </a:xfrm>
-          <a:prstGeom prst="rect">
-            <a:avLst/>
-          </a:prstGeom>
-        </p:spPr>
-      </p:pic>
-    </p:spTree>
-    <p:extLst>
-      <p:ext uri="{BB962C8B-B14F-4D97-AF65-F5344CB8AC3E}">
-        <p14:creationId xmlns:p14="http://schemas.microsoft.com/office/powerpoint/2010/main" val="2595486357"/>
       </p:ext>
     </p:extLst>
   </p:cSld>

</xml_diff>